<commit_message>
Milestone 3 stuff almost done
</commit_message>
<xml_diff>
--- a/Documents/Presentations/Milestone 3 presentation.pptx
+++ b/Documents/Presentations/Milestone 3 presentation.pptx
@@ -8,12 +8,15 @@
     <p:sldId id="256" r:id="rId2"/>
     <p:sldId id="266" r:id="rId3"/>
     <p:sldId id="267" r:id="rId4"/>
-    <p:sldId id="268" r:id="rId5"/>
-    <p:sldId id="269" r:id="rId6"/>
-    <p:sldId id="260" r:id="rId7"/>
-    <p:sldId id="262" r:id="rId8"/>
-    <p:sldId id="264" r:id="rId9"/>
-    <p:sldId id="265" r:id="rId10"/>
+    <p:sldId id="270" r:id="rId5"/>
+    <p:sldId id="271" r:id="rId6"/>
+    <p:sldId id="272" r:id="rId7"/>
+    <p:sldId id="273" r:id="rId8"/>
+    <p:sldId id="274" r:id="rId9"/>
+    <p:sldId id="260" r:id="rId10"/>
+    <p:sldId id="262" r:id="rId11"/>
+    <p:sldId id="264" r:id="rId12"/>
+    <p:sldId id="265" r:id="rId13"/>
   </p:sldIdLst>
   <p:sldSz cx="12192000" cy="6858000"/>
   <p:notesSz cx="6858000" cy="9144000"/>
@@ -114,7 +117,7 @@
   </p:defaultTextStyle>
   <p:extLst>
     <p:ext uri="{EFAFB233-063F-42B5-8137-9DF3F51BA10A}">
-      <p15:sldGuideLst xmlns:p15="http://schemas.microsoft.com/office/powerpoint/2012/main">
+      <p15:sldGuideLst xmlns:p15="http://schemas.microsoft.com/office/powerpoint/2012/main" xmlns="">
         <p15:guide id="1" orient="horz" pos="2160">
           <p15:clr>
             <a:srgbClr val="A4A3A4"/>
@@ -3239,9 +3242,821 @@
     </p:spTree>
     <p:extLst>
       <p:ext uri="{BB962C8B-B14F-4D97-AF65-F5344CB8AC3E}">
-        <p14:creationId xmlns:p14="http://schemas.microsoft.com/office/powerpoint/2010/main" val="515178540"/>
+        <p14:creationId xmlns:p14="http://schemas.microsoft.com/office/powerpoint/2010/main" xmlns="" val="515178540"/>
       </p:ext>
     </p:extLst>
+  </p:cSld>
+  <p:clrMapOvr>
+    <a:masterClrMapping/>
+  </p:clrMapOvr>
+</p:sld>
+</file>
+
+<file path=ppt/slides/slide10.xml><?xml version="1.0" encoding="utf-8"?>
+<p:sld xmlns:a="http://schemas.openxmlformats.org/drawingml/2006/main" xmlns:r="http://schemas.openxmlformats.org/officeDocument/2006/relationships" xmlns:p="http://schemas.openxmlformats.org/presentationml/2006/main">
+  <p:cSld>
+    <p:spTree>
+      <p:nvGrpSpPr>
+        <p:cNvPr id="1" name=""/>
+        <p:cNvGrpSpPr/>
+        <p:nvPr/>
+      </p:nvGrpSpPr>
+      <p:grpSpPr>
+        <a:xfrm>
+          <a:off x="0" y="0"/>
+          <a:ext cx="0" cy="0"/>
+          <a:chOff x="0" y="0"/>
+          <a:chExt cx="0" cy="0"/>
+        </a:xfrm>
+      </p:grpSpPr>
+      <p:sp>
+        <p:nvSpPr>
+          <p:cNvPr id="2" name="Title 1"/>
+          <p:cNvSpPr>
+            <a:spLocks noGrp="1"/>
+          </p:cNvSpPr>
+          <p:nvPr>
+            <p:ph type="title"/>
+          </p:nvPr>
+        </p:nvSpPr>
+        <p:spPr/>
+        <p:txBody>
+          <a:bodyPr/>
+          <a:lstStyle/>
+          <a:p>
+            <a:r>
+              <a:rPr lang="en-US" dirty="0" smtClean="0"/>
+              <a:t>Milestone 4</a:t>
+            </a:r>
+            <a:endParaRPr lang="en-US" dirty="0"/>
+          </a:p>
+        </p:txBody>
+      </p:sp>
+    </p:spTree>
+  </p:cSld>
+  <p:clrMapOvr>
+    <a:masterClrMapping/>
+  </p:clrMapOvr>
+</p:sld>
+</file>
+
+<file path=ppt/slides/slide11.xml><?xml version="1.0" encoding="utf-8"?>
+<p:sld xmlns:a="http://schemas.openxmlformats.org/drawingml/2006/main" xmlns:r="http://schemas.openxmlformats.org/officeDocument/2006/relationships" xmlns:p="http://schemas.openxmlformats.org/presentationml/2006/main">
+  <p:cSld>
+    <p:spTree>
+      <p:nvGrpSpPr>
+        <p:cNvPr id="1" name=""/>
+        <p:cNvGrpSpPr/>
+        <p:nvPr/>
+      </p:nvGrpSpPr>
+      <p:grpSpPr>
+        <a:xfrm>
+          <a:off x="0" y="0"/>
+          <a:ext cx="0" cy="0"/>
+          <a:chOff x="0" y="0"/>
+          <a:chExt cx="0" cy="0"/>
+        </a:xfrm>
+      </p:grpSpPr>
+      <p:sp>
+        <p:nvSpPr>
+          <p:cNvPr id="2" name="Title 1"/>
+          <p:cNvSpPr>
+            <a:spLocks noGrp="1"/>
+          </p:cNvSpPr>
+          <p:nvPr>
+            <p:ph type="title"/>
+          </p:nvPr>
+        </p:nvSpPr>
+        <p:spPr>
+          <a:xfrm>
+            <a:off x="1619794" y="0"/>
+            <a:ext cx="8878388" cy="731520"/>
+          </a:xfrm>
+        </p:spPr>
+        <p:txBody>
+          <a:bodyPr>
+            <a:normAutofit/>
+          </a:bodyPr>
+          <a:lstStyle/>
+          <a:p>
+            <a:r>
+              <a:rPr lang="en-US" sz="3600" smtClean="0"/>
+              <a:t>Milestone </a:t>
+            </a:r>
+            <a:r>
+              <a:rPr lang="en-US" sz="3600" dirty="0"/>
+              <a:t>4</a:t>
+            </a:r>
+            <a:r>
+              <a:rPr lang="en-US" sz="3600" smtClean="0"/>
+              <a:t> </a:t>
+            </a:r>
+            <a:r>
+              <a:rPr lang="en-US" sz="3600" dirty="0" smtClean="0"/>
+              <a:t>Role Distribution</a:t>
+            </a:r>
+            <a:endParaRPr lang="en-US" sz="3600" dirty="0"/>
+          </a:p>
+        </p:txBody>
+      </p:sp>
+      <p:graphicFrame>
+        <p:nvGraphicFramePr>
+          <p:cNvPr id="4" name="Content Placeholder 3"/>
+          <p:cNvGraphicFramePr>
+            <a:graphicFrameLocks noGrp="1"/>
+          </p:cNvGraphicFramePr>
+          <p:nvPr>
+            <p:ph idx="1"/>
+            <p:extLst>
+              <p:ext uri="{D42A27DB-BD31-4B8C-83A1-F6EECF244321}">
+                <p14:modId xmlns:p14="http://schemas.microsoft.com/office/powerpoint/2010/main" xmlns="" val="1383281811"/>
+              </p:ext>
+            </p:extLst>
+          </p:nvPr>
+        </p:nvGraphicFramePr>
+        <p:xfrm>
+          <a:off x="374469" y="913239"/>
+          <a:ext cx="11373395" cy="5012072"/>
+        </p:xfrm>
+        <a:graphic>
+          <a:graphicData uri="http://schemas.openxmlformats.org/drawingml/2006/table">
+            <a:tbl>
+              <a:tblPr firstRow="1" bandRow="1">
+                <a:tableStyleId>{5C22544A-7EE6-4342-B048-85BDC9FD1C3A}</a:tableStyleId>
+              </a:tblPr>
+              <a:tblGrid>
+                <a:gridCol w="2274679"/>
+                <a:gridCol w="2274679"/>
+                <a:gridCol w="2274679"/>
+                <a:gridCol w="2274679"/>
+                <a:gridCol w="2274679"/>
+              </a:tblGrid>
+              <a:tr h="602052">
+                <a:tc>
+                  <a:txBody>
+                    <a:bodyPr/>
+                    <a:lstStyle/>
+                    <a:p>
+                      <a:pPr marL="0" marR="0" algn="ctr">
+                        <a:spcBef>
+                          <a:spcPts val="0"/>
+                        </a:spcBef>
+                        <a:spcAft>
+                          <a:spcPts val="0"/>
+                        </a:spcAft>
+                      </a:pPr>
+                      <a:r>
+                        <a:rPr lang="en-US" sz="1800" dirty="0">
+                          <a:latin typeface="Calibri"/>
+                          <a:ea typeface="Calibri"/>
+                          <a:cs typeface="Times New Roman"/>
+                        </a:rPr>
+                        <a:t>Task</a:t>
+                      </a:r>
+                    </a:p>
+                  </a:txBody>
+                  <a:tcPr marL="68580" marR="68580" marT="0" marB="0"/>
+                </a:tc>
+                <a:tc>
+                  <a:txBody>
+                    <a:bodyPr/>
+                    <a:lstStyle/>
+                    <a:p>
+                      <a:pPr marL="0" marR="0" algn="ctr">
+                        <a:spcBef>
+                          <a:spcPts val="0"/>
+                        </a:spcBef>
+                        <a:spcAft>
+                          <a:spcPts val="0"/>
+                        </a:spcAft>
+                      </a:pPr>
+                      <a:r>
+                        <a:rPr lang="en-US" sz="1800" dirty="0">
+                          <a:latin typeface="Calibri"/>
+                          <a:ea typeface="Calibri"/>
+                          <a:cs typeface="Times New Roman"/>
+                        </a:rPr>
+                        <a:t>Kenneth Truex</a:t>
+                      </a:r>
+                    </a:p>
+                  </a:txBody>
+                  <a:tcPr marL="68580" marR="68580" marT="0" marB="0"/>
+                </a:tc>
+                <a:tc>
+                  <a:txBody>
+                    <a:bodyPr/>
+                    <a:lstStyle/>
+                    <a:p>
+                      <a:pPr marL="0" marR="0" algn="ctr">
+                        <a:spcBef>
+                          <a:spcPts val="0"/>
+                        </a:spcBef>
+                        <a:spcAft>
+                          <a:spcPts val="0"/>
+                        </a:spcAft>
+                      </a:pPr>
+                      <a:r>
+                        <a:rPr lang="en-US" sz="1800" dirty="0">
+                          <a:latin typeface="Calibri"/>
+                          <a:ea typeface="Calibri"/>
+                          <a:cs typeface="Times New Roman"/>
+                        </a:rPr>
+                        <a:t>Christopher Diebold</a:t>
+                      </a:r>
+                    </a:p>
+                  </a:txBody>
+                  <a:tcPr marL="68580" marR="68580" marT="0" marB="0"/>
+                </a:tc>
+                <a:tc>
+                  <a:txBody>
+                    <a:bodyPr/>
+                    <a:lstStyle/>
+                    <a:p>
+                      <a:pPr marL="0" marR="0" algn="ctr">
+                        <a:spcBef>
+                          <a:spcPts val="0"/>
+                        </a:spcBef>
+                        <a:spcAft>
+                          <a:spcPts val="0"/>
+                        </a:spcAft>
+                      </a:pPr>
+                      <a:r>
+                        <a:rPr lang="en-US" sz="1800" dirty="0">
+                          <a:latin typeface="Calibri"/>
+                          <a:ea typeface="Calibri"/>
+                          <a:cs typeface="Times New Roman"/>
+                        </a:rPr>
+                        <a:t>Chad Mason</a:t>
+                      </a:r>
+                    </a:p>
+                  </a:txBody>
+                  <a:tcPr marL="68580" marR="68580" marT="0" marB="0"/>
+                </a:tc>
+                <a:tc>
+                  <a:txBody>
+                    <a:bodyPr/>
+                    <a:lstStyle/>
+                    <a:p>
+                      <a:pPr marL="0" marR="0" algn="ctr">
+                        <a:spcBef>
+                          <a:spcPts val="0"/>
+                        </a:spcBef>
+                        <a:spcAft>
+                          <a:spcPts val="0"/>
+                        </a:spcAft>
+                      </a:pPr>
+                      <a:r>
+                        <a:rPr lang="en-US" sz="1800" dirty="0">
+                          <a:latin typeface="Calibri"/>
+                          <a:ea typeface="Calibri"/>
+                          <a:cs typeface="Times New Roman"/>
+                        </a:rPr>
+                        <a:t>Zachary McHenry</a:t>
+                      </a:r>
+                    </a:p>
+                  </a:txBody>
+                  <a:tcPr marL="68580" marR="68580" marT="0" marB="0"/>
+                </a:tc>
+              </a:tr>
+              <a:tr h="1102505">
+                <a:tc>
+                  <a:txBody>
+                    <a:bodyPr/>
+                    <a:lstStyle/>
+                    <a:p>
+                      <a:pPr marL="0" marR="0" algn="ctr">
+                        <a:spcBef>
+                          <a:spcPts val="0"/>
+                        </a:spcBef>
+                        <a:spcAft>
+                          <a:spcPts val="0"/>
+                        </a:spcAft>
+                      </a:pPr>
+                      <a:endParaRPr lang="en-US" sz="1600" dirty="0">
+                        <a:latin typeface="Calibri"/>
+                        <a:ea typeface="Calibri"/>
+                        <a:cs typeface="Times New Roman"/>
+                      </a:endParaRPr>
+                    </a:p>
+                  </a:txBody>
+                  <a:tcPr marL="68580" marR="68580" marT="0" marB="0"/>
+                </a:tc>
+                <a:tc>
+                  <a:txBody>
+                    <a:bodyPr/>
+                    <a:lstStyle/>
+                    <a:p>
+                      <a:pPr marL="0" marR="0" algn="ctr">
+                        <a:spcBef>
+                          <a:spcPts val="0"/>
+                        </a:spcBef>
+                        <a:spcAft>
+                          <a:spcPts val="0"/>
+                        </a:spcAft>
+                      </a:pPr>
+                      <a:endParaRPr lang="en-US" sz="1600" dirty="0">
+                        <a:latin typeface="Calibri"/>
+                        <a:ea typeface="Calibri"/>
+                        <a:cs typeface="Times New Roman"/>
+                      </a:endParaRPr>
+                    </a:p>
+                  </a:txBody>
+                  <a:tcPr marL="68580" marR="68580" marT="0" marB="0"/>
+                </a:tc>
+                <a:tc>
+                  <a:txBody>
+                    <a:bodyPr/>
+                    <a:lstStyle/>
+                    <a:p>
+                      <a:pPr marL="0" marR="0" algn="ctr">
+                        <a:spcBef>
+                          <a:spcPts val="0"/>
+                        </a:spcBef>
+                        <a:spcAft>
+                          <a:spcPts val="0"/>
+                        </a:spcAft>
+                      </a:pPr>
+                      <a:endParaRPr lang="en-US" sz="1600" dirty="0">
+                        <a:latin typeface="Calibri"/>
+                        <a:ea typeface="Calibri"/>
+                        <a:cs typeface="Times New Roman"/>
+                      </a:endParaRPr>
+                    </a:p>
+                  </a:txBody>
+                  <a:tcPr marL="68580" marR="68580" marT="0" marB="0"/>
+                </a:tc>
+                <a:tc>
+                  <a:txBody>
+                    <a:bodyPr/>
+                    <a:lstStyle/>
+                    <a:p>
+                      <a:pPr marL="0" marR="0" algn="ctr">
+                        <a:spcBef>
+                          <a:spcPts val="0"/>
+                        </a:spcBef>
+                        <a:spcAft>
+                          <a:spcPts val="0"/>
+                        </a:spcAft>
+                      </a:pPr>
+                      <a:endParaRPr lang="en-US" sz="1600" dirty="0">
+                        <a:latin typeface="Calibri"/>
+                        <a:ea typeface="Calibri"/>
+                        <a:cs typeface="Times New Roman"/>
+                      </a:endParaRPr>
+                    </a:p>
+                  </a:txBody>
+                  <a:tcPr marL="68580" marR="68580" marT="0" marB="0"/>
+                </a:tc>
+                <a:tc>
+                  <a:txBody>
+                    <a:bodyPr/>
+                    <a:lstStyle/>
+                    <a:p>
+                      <a:pPr marL="0" marR="0" algn="ctr">
+                        <a:spcBef>
+                          <a:spcPts val="0"/>
+                        </a:spcBef>
+                        <a:spcAft>
+                          <a:spcPts val="0"/>
+                        </a:spcAft>
+                      </a:pPr>
+                      <a:endParaRPr lang="en-US" sz="1600" dirty="0">
+                        <a:latin typeface="Calibri"/>
+                        <a:ea typeface="Calibri"/>
+                        <a:cs typeface="Times New Roman"/>
+                      </a:endParaRPr>
+                    </a:p>
+                  </a:txBody>
+                  <a:tcPr marL="68580" marR="68580" marT="0" marB="0"/>
+                </a:tc>
+              </a:tr>
+              <a:tr h="1102505">
+                <a:tc>
+                  <a:txBody>
+                    <a:bodyPr/>
+                    <a:lstStyle/>
+                    <a:p>
+                      <a:pPr marL="0" marR="0" algn="ctr">
+                        <a:spcBef>
+                          <a:spcPts val="0"/>
+                        </a:spcBef>
+                        <a:spcAft>
+                          <a:spcPts val="0"/>
+                        </a:spcAft>
+                      </a:pPr>
+                      <a:endParaRPr lang="en-US" sz="1600" dirty="0">
+                        <a:latin typeface="Calibri"/>
+                        <a:ea typeface="Calibri"/>
+                        <a:cs typeface="Times New Roman"/>
+                      </a:endParaRPr>
+                    </a:p>
+                  </a:txBody>
+                  <a:tcPr marL="68580" marR="68580" marT="0" marB="0"/>
+                </a:tc>
+                <a:tc>
+                  <a:txBody>
+                    <a:bodyPr/>
+                    <a:lstStyle/>
+                    <a:p>
+                      <a:pPr marL="0" marR="0" algn="ctr">
+                        <a:spcBef>
+                          <a:spcPts val="0"/>
+                        </a:spcBef>
+                        <a:spcAft>
+                          <a:spcPts val="0"/>
+                        </a:spcAft>
+                      </a:pPr>
+                      <a:endParaRPr lang="en-US" sz="1600" dirty="0">
+                        <a:latin typeface="Calibri"/>
+                        <a:ea typeface="Calibri"/>
+                        <a:cs typeface="Times New Roman"/>
+                      </a:endParaRPr>
+                    </a:p>
+                  </a:txBody>
+                  <a:tcPr marL="68580" marR="68580" marT="0" marB="0"/>
+                </a:tc>
+                <a:tc>
+                  <a:txBody>
+                    <a:bodyPr/>
+                    <a:lstStyle/>
+                    <a:p>
+                      <a:pPr marL="0" marR="0" algn="ctr">
+                        <a:spcBef>
+                          <a:spcPts val="0"/>
+                        </a:spcBef>
+                        <a:spcAft>
+                          <a:spcPts val="0"/>
+                        </a:spcAft>
+                      </a:pPr>
+                      <a:endParaRPr lang="en-US" sz="1600" dirty="0">
+                        <a:latin typeface="Calibri"/>
+                        <a:ea typeface="Calibri"/>
+                        <a:cs typeface="Times New Roman"/>
+                      </a:endParaRPr>
+                    </a:p>
+                  </a:txBody>
+                  <a:tcPr marL="68580" marR="68580" marT="0" marB="0"/>
+                </a:tc>
+                <a:tc>
+                  <a:txBody>
+                    <a:bodyPr/>
+                    <a:lstStyle/>
+                    <a:p>
+                      <a:pPr marL="0" marR="0" algn="ctr">
+                        <a:spcBef>
+                          <a:spcPts val="0"/>
+                        </a:spcBef>
+                        <a:spcAft>
+                          <a:spcPts val="0"/>
+                        </a:spcAft>
+                      </a:pPr>
+                      <a:endParaRPr lang="en-US" sz="1600" dirty="0">
+                        <a:latin typeface="Calibri"/>
+                        <a:ea typeface="Calibri"/>
+                        <a:cs typeface="Times New Roman"/>
+                      </a:endParaRPr>
+                    </a:p>
+                  </a:txBody>
+                  <a:tcPr marL="68580" marR="68580" marT="0" marB="0"/>
+                </a:tc>
+                <a:tc>
+                  <a:txBody>
+                    <a:bodyPr/>
+                    <a:lstStyle/>
+                    <a:p>
+                      <a:pPr marL="0" marR="0" algn="ctr">
+                        <a:spcBef>
+                          <a:spcPts val="0"/>
+                        </a:spcBef>
+                        <a:spcAft>
+                          <a:spcPts val="0"/>
+                        </a:spcAft>
+                      </a:pPr>
+                      <a:endParaRPr lang="en-US" sz="1600" dirty="0">
+                        <a:latin typeface="Calibri"/>
+                        <a:ea typeface="Calibri"/>
+                        <a:cs typeface="Times New Roman"/>
+                      </a:endParaRPr>
+                    </a:p>
+                  </a:txBody>
+                  <a:tcPr marL="68580" marR="68580" marT="0" marB="0"/>
+                </a:tc>
+              </a:tr>
+              <a:tr h="1102505">
+                <a:tc>
+                  <a:txBody>
+                    <a:bodyPr/>
+                    <a:lstStyle/>
+                    <a:p>
+                      <a:pPr marL="0" marR="0" algn="ctr">
+                        <a:spcBef>
+                          <a:spcPts val="0"/>
+                        </a:spcBef>
+                        <a:spcAft>
+                          <a:spcPts val="0"/>
+                        </a:spcAft>
+                      </a:pPr>
+                      <a:endParaRPr lang="en-US" sz="1600" dirty="0">
+                        <a:latin typeface="Calibri"/>
+                        <a:ea typeface="Calibri"/>
+                        <a:cs typeface="Times New Roman"/>
+                      </a:endParaRPr>
+                    </a:p>
+                  </a:txBody>
+                  <a:tcPr marL="68580" marR="68580" marT="0" marB="0"/>
+                </a:tc>
+                <a:tc>
+                  <a:txBody>
+                    <a:bodyPr/>
+                    <a:lstStyle/>
+                    <a:p>
+                      <a:pPr marL="0" marR="0" algn="ctr">
+                        <a:spcBef>
+                          <a:spcPts val="0"/>
+                        </a:spcBef>
+                        <a:spcAft>
+                          <a:spcPts val="0"/>
+                        </a:spcAft>
+                      </a:pPr>
+                      <a:endParaRPr lang="en-US" sz="1600" dirty="0">
+                        <a:latin typeface="Calibri"/>
+                        <a:ea typeface="Calibri"/>
+                        <a:cs typeface="Times New Roman"/>
+                      </a:endParaRPr>
+                    </a:p>
+                  </a:txBody>
+                  <a:tcPr marL="68580" marR="68580" marT="0" marB="0"/>
+                </a:tc>
+                <a:tc>
+                  <a:txBody>
+                    <a:bodyPr/>
+                    <a:lstStyle/>
+                    <a:p>
+                      <a:pPr marL="0" marR="0" algn="ctr">
+                        <a:spcBef>
+                          <a:spcPts val="0"/>
+                        </a:spcBef>
+                        <a:spcAft>
+                          <a:spcPts val="0"/>
+                        </a:spcAft>
+                      </a:pPr>
+                      <a:endParaRPr lang="en-US" sz="1600" dirty="0">
+                        <a:latin typeface="Calibri"/>
+                        <a:ea typeface="Calibri"/>
+                        <a:cs typeface="Times New Roman"/>
+                      </a:endParaRPr>
+                    </a:p>
+                  </a:txBody>
+                  <a:tcPr marL="68580" marR="68580" marT="0" marB="0"/>
+                </a:tc>
+                <a:tc>
+                  <a:txBody>
+                    <a:bodyPr/>
+                    <a:lstStyle/>
+                    <a:p>
+                      <a:pPr marL="0" marR="0" algn="ctr">
+                        <a:spcBef>
+                          <a:spcPts val="0"/>
+                        </a:spcBef>
+                        <a:spcAft>
+                          <a:spcPts val="0"/>
+                        </a:spcAft>
+                      </a:pPr>
+                      <a:endParaRPr lang="en-US" sz="1600" dirty="0">
+                        <a:latin typeface="Calibri"/>
+                        <a:ea typeface="Calibri"/>
+                        <a:cs typeface="Times New Roman"/>
+                      </a:endParaRPr>
+                    </a:p>
+                  </a:txBody>
+                  <a:tcPr marL="68580" marR="68580" marT="0" marB="0"/>
+                </a:tc>
+                <a:tc>
+                  <a:txBody>
+                    <a:bodyPr/>
+                    <a:lstStyle/>
+                    <a:p>
+                      <a:pPr marL="0" marR="0" algn="ctr">
+                        <a:spcBef>
+                          <a:spcPts val="0"/>
+                        </a:spcBef>
+                        <a:spcAft>
+                          <a:spcPts val="0"/>
+                        </a:spcAft>
+                      </a:pPr>
+                      <a:endParaRPr lang="en-US" sz="1600" dirty="0">
+                        <a:latin typeface="Calibri"/>
+                        <a:ea typeface="Calibri"/>
+                        <a:cs typeface="Times New Roman"/>
+                      </a:endParaRPr>
+                    </a:p>
+                  </a:txBody>
+                  <a:tcPr marL="68580" marR="68580" marT="0" marB="0"/>
+                </a:tc>
+              </a:tr>
+              <a:tr h="1102505">
+                <a:tc>
+                  <a:txBody>
+                    <a:bodyPr/>
+                    <a:lstStyle/>
+                    <a:p>
+                      <a:pPr marL="0" marR="0" algn="ctr">
+                        <a:spcBef>
+                          <a:spcPts val="0"/>
+                        </a:spcBef>
+                        <a:spcAft>
+                          <a:spcPts val="0"/>
+                        </a:spcAft>
+                      </a:pPr>
+                      <a:endParaRPr lang="en-US" sz="1600" dirty="0">
+                        <a:latin typeface="Calibri"/>
+                        <a:ea typeface="Calibri"/>
+                        <a:cs typeface="Times New Roman"/>
+                      </a:endParaRPr>
+                    </a:p>
+                  </a:txBody>
+                  <a:tcPr marL="68580" marR="68580" marT="0" marB="0"/>
+                </a:tc>
+                <a:tc>
+                  <a:txBody>
+                    <a:bodyPr/>
+                    <a:lstStyle/>
+                    <a:p>
+                      <a:pPr marL="0" marR="0" algn="ctr">
+                        <a:spcBef>
+                          <a:spcPts val="0"/>
+                        </a:spcBef>
+                        <a:spcAft>
+                          <a:spcPts val="0"/>
+                        </a:spcAft>
+                      </a:pPr>
+                      <a:endParaRPr lang="en-US" sz="1600" dirty="0">
+                        <a:latin typeface="Calibri"/>
+                        <a:ea typeface="Calibri"/>
+                        <a:cs typeface="Times New Roman"/>
+                      </a:endParaRPr>
+                    </a:p>
+                  </a:txBody>
+                  <a:tcPr marL="68580" marR="68580" marT="0" marB="0"/>
+                </a:tc>
+                <a:tc>
+                  <a:txBody>
+                    <a:bodyPr/>
+                    <a:lstStyle/>
+                    <a:p>
+                      <a:pPr marL="0" marR="0" algn="ctr">
+                        <a:spcBef>
+                          <a:spcPts val="0"/>
+                        </a:spcBef>
+                        <a:spcAft>
+                          <a:spcPts val="0"/>
+                        </a:spcAft>
+                      </a:pPr>
+                      <a:endParaRPr lang="en-US" sz="1600" dirty="0">
+                        <a:latin typeface="Calibri"/>
+                        <a:ea typeface="Calibri"/>
+                        <a:cs typeface="Times New Roman"/>
+                      </a:endParaRPr>
+                    </a:p>
+                  </a:txBody>
+                  <a:tcPr marL="68580" marR="68580" marT="0" marB="0"/>
+                </a:tc>
+                <a:tc>
+                  <a:txBody>
+                    <a:bodyPr/>
+                    <a:lstStyle/>
+                    <a:p>
+                      <a:pPr marL="0" marR="0" algn="ctr">
+                        <a:spcBef>
+                          <a:spcPts val="0"/>
+                        </a:spcBef>
+                        <a:spcAft>
+                          <a:spcPts val="0"/>
+                        </a:spcAft>
+                      </a:pPr>
+                      <a:endParaRPr lang="en-US" sz="1600" dirty="0">
+                        <a:latin typeface="Calibri"/>
+                        <a:ea typeface="Calibri"/>
+                        <a:cs typeface="Times New Roman"/>
+                      </a:endParaRPr>
+                    </a:p>
+                  </a:txBody>
+                  <a:tcPr marL="68580" marR="68580" marT="0" marB="0"/>
+                </a:tc>
+                <a:tc>
+                  <a:txBody>
+                    <a:bodyPr/>
+                    <a:lstStyle/>
+                    <a:p>
+                      <a:pPr marL="0" marR="0" algn="ctr">
+                        <a:spcBef>
+                          <a:spcPts val="0"/>
+                        </a:spcBef>
+                        <a:spcAft>
+                          <a:spcPts val="0"/>
+                        </a:spcAft>
+                      </a:pPr>
+                      <a:endParaRPr lang="en-US" sz="1600" dirty="0">
+                        <a:latin typeface="Calibri"/>
+                        <a:ea typeface="Calibri"/>
+                        <a:cs typeface="Times New Roman"/>
+                      </a:endParaRPr>
+                    </a:p>
+                  </a:txBody>
+                  <a:tcPr marL="68580" marR="68580" marT="0" marB="0"/>
+                </a:tc>
+              </a:tr>
+            </a:tbl>
+          </a:graphicData>
+        </a:graphic>
+      </p:graphicFrame>
+    </p:spTree>
+  </p:cSld>
+  <p:clrMapOvr>
+    <a:masterClrMapping/>
+  </p:clrMapOvr>
+</p:sld>
+</file>
+
+<file path=ppt/slides/slide12.xml><?xml version="1.0" encoding="utf-8"?>
+<p:sld xmlns:a="http://schemas.openxmlformats.org/drawingml/2006/main" xmlns:r="http://schemas.openxmlformats.org/officeDocument/2006/relationships" xmlns:p="http://schemas.openxmlformats.org/presentationml/2006/main">
+  <p:cSld>
+    <p:spTree>
+      <p:nvGrpSpPr>
+        <p:cNvPr id="1" name=""/>
+        <p:cNvGrpSpPr/>
+        <p:nvPr/>
+      </p:nvGrpSpPr>
+      <p:grpSpPr>
+        <a:xfrm>
+          <a:off x="0" y="0"/>
+          <a:ext cx="0" cy="0"/>
+          <a:chOff x="0" y="0"/>
+          <a:chExt cx="0" cy="0"/>
+        </a:xfrm>
+      </p:grpSpPr>
+      <p:pic>
+        <p:nvPicPr>
+          <p:cNvPr id="6" name="Content Placeholder 5" descr="getrains3.jpg"/>
+          <p:cNvPicPr>
+            <a:picLocks noGrp="1" noChangeAspect="1"/>
+          </p:cNvPicPr>
+          <p:nvPr>
+            <p:ph idx="1"/>
+          </p:nvPr>
+        </p:nvPicPr>
+        <p:blipFill>
+          <a:blip r:embed="rId2" cstate="print"/>
+          <a:stretch>
+            <a:fillRect/>
+          </a:stretch>
+        </p:blipFill>
+        <p:spPr>
+          <a:xfrm>
+            <a:off x="22706" y="5871"/>
+            <a:ext cx="12169294" cy="6794471"/>
+          </a:xfrm>
+        </p:spPr>
+      </p:pic>
+      <p:sp>
+        <p:nvSpPr>
+          <p:cNvPr id="7" name="TextBox 6"/>
+          <p:cNvSpPr txBox="1"/>
+          <p:nvPr/>
+        </p:nvSpPr>
+        <p:spPr>
+          <a:xfrm>
+            <a:off x="169818" y="195943"/>
+            <a:ext cx="5081840" cy="923330"/>
+          </a:xfrm>
+          <a:prstGeom prst="rect">
+            <a:avLst/>
+          </a:prstGeom>
+          <a:noFill/>
+        </p:spPr>
+        <p:txBody>
+          <a:bodyPr wrap="none" rtlCol="0">
+            <a:spAutoFit/>
+          </a:bodyPr>
+          <a:lstStyle/>
+          <a:p>
+            <a:r>
+              <a:rPr lang="en-US" sz="5400" dirty="0" smtClean="0">
+                <a:solidFill>
+                  <a:schemeClr val="bg1"/>
+                </a:solidFill>
+              </a:rPr>
+              <a:t>Any Questions?</a:t>
+            </a:r>
+            <a:endParaRPr lang="en-US" sz="5400" dirty="0">
+              <a:solidFill>
+                <a:schemeClr val="bg1"/>
+              </a:solidFill>
+            </a:endParaRPr>
+          </a:p>
+        </p:txBody>
+      </p:sp>
+    </p:spTree>
   </p:cSld>
   <p:clrMapOvr>
     <a:masterClrMapping/>
@@ -3299,14 +4114,14 @@
             <p:ph idx="1"/>
             <p:extLst>
               <p:ext uri="{D42A27DB-BD31-4B8C-83A1-F6EECF244321}">
-                <p14:modId xmlns:p14="http://schemas.microsoft.com/office/powerpoint/2010/main" val="4218020183"/>
+                <p14:modId xmlns:p14="http://schemas.microsoft.com/office/powerpoint/2010/main" xmlns="" val="4218020183"/>
               </p:ext>
             </p:extLst>
           </p:nvPr>
         </p:nvGraphicFramePr>
         <p:xfrm>
-          <a:off x="1103086" y="1417638"/>
-          <a:ext cx="10116456" cy="4576762"/>
+          <a:off x="1508035" y="1356680"/>
+          <a:ext cx="10300788" cy="4569286"/>
         </p:xfrm>
         <a:graphic>
           <a:graphicData uri="http://schemas.openxmlformats.org/drawingml/2006/table">
@@ -3315,15 +4130,15 @@
                 <a:tableStyleId>{5C22544A-7EE6-4342-B048-85BDC9FD1C3A}</a:tableStyleId>
               </a:tblPr>
               <a:tblGrid>
+                <a:gridCol w="1875245"/>
+                <a:gridCol w="1149531"/>
+                <a:gridCol w="1310848"/>
                 <a:gridCol w="1445208"/>
                 <a:gridCol w="1445208"/>
                 <a:gridCol w="1445208"/>
-                <a:gridCol w="1445208"/>
-                <a:gridCol w="1445208"/>
-                <a:gridCol w="1445208"/>
-                <a:gridCol w="1445208"/>
+                <a:gridCol w="1629540"/>
               </a:tblGrid>
-              <a:tr h="921249">
+              <a:tr h="0">
                 <a:tc>
                   <a:txBody>
                     <a:bodyPr/>
@@ -3555,7 +4370,7 @@
                   <a:tcPr marL="68580" marR="68580" marT="0" marB="0"/>
                 </a:tc>
               </a:tr>
-              <a:tr h="2126933">
+              <a:tr h="969599">
                 <a:tc>
                   <a:txBody>
                     <a:bodyPr/>
@@ -3572,6 +4387,17 @@
                           <a:spcPts val="0"/>
                         </a:spcAft>
                       </a:pPr>
+                      <a:r>
+                        <a:rPr kumimoji="0" lang="en-US" sz="1800" b="1" kern="1200" dirty="0" smtClean="0">
+                          <a:solidFill>
+                            <a:schemeClr val="lt1"/>
+                          </a:solidFill>
+                          <a:latin typeface="+mn-lt"/>
+                          <a:ea typeface="+mn-ea"/>
+                          <a:cs typeface="+mn-cs"/>
+                        </a:rPr>
+                        <a:t>Create the user forms</a:t>
+                      </a:r>
                       <a:r>
                         <a:rPr kumimoji="0" lang="en-US" sz="1400" b="1" kern="1200" dirty="0" smtClean="0">
                           <a:solidFill>
@@ -3614,7 +4440,7 @@
                         <a:rPr lang="en-US" sz="1400" dirty="0" smtClean="0">
                           <a:effectLst/>
                         </a:rPr>
-                        <a:t> </a:t>
+                        <a:t>70% </a:t>
                       </a:r>
                       <a:endParaRPr lang="en-US" sz="1400" dirty="0">
                         <a:effectLst/>
@@ -3694,6 +4520,15 @@
                           <a:spcPts val="0"/>
                         </a:spcAft>
                       </a:pPr>
+                      <a:r>
+                        <a:rPr lang="en-US" sz="1400" dirty="0" smtClean="0">
+                          <a:effectLst/>
+                          <a:latin typeface="Calibri" panose="020F0502020204030204" pitchFamily="34" charset="0"/>
+                          <a:ea typeface="Calibri" panose="020F0502020204030204" pitchFamily="34" charset="0"/>
+                          <a:cs typeface="Times New Roman" panose="02020603050405020304" pitchFamily="18" charset="0"/>
+                        </a:rPr>
+                        <a:t>70%</a:t>
+                      </a:r>
                       <a:endParaRPr lang="en-US" sz="1400" dirty="0">
                         <a:effectLst/>
                         <a:latin typeface="Calibri" panose="020F0502020204030204" pitchFamily="34" charset="0"/>
@@ -3746,6 +4581,17 @@
                           <a:spcPts val="0"/>
                         </a:spcAft>
                       </a:pPr>
+                      <a:r>
+                        <a:rPr kumimoji="0" lang="en-US" sz="1800" kern="1200" dirty="0" smtClean="0">
+                          <a:solidFill>
+                            <a:schemeClr val="dk1"/>
+                          </a:solidFill>
+                          <a:latin typeface="+mn-lt"/>
+                          <a:ea typeface="+mn-ea"/>
+                          <a:cs typeface="+mn-cs"/>
+                        </a:rPr>
+                        <a:t>Implement GE’s UI Template </a:t>
+                      </a:r>
                       <a:r>
                         <a:rPr lang="en-US" sz="1400" dirty="0" smtClean="0">
                           <a:effectLst/>
@@ -3766,7 +4612,7 @@
                   <a:tcPr marL="68580" marR="68580" marT="0" marB="0"/>
                 </a:tc>
               </a:tr>
-              <a:tr h="1528580">
+              <a:tr h="718457">
                 <a:tc>
                   <a:txBody>
                     <a:bodyPr/>
@@ -3783,6 +4629,17 @@
                           <a:spcPts val="0"/>
                         </a:spcAft>
                       </a:pPr>
+                      <a:r>
+                        <a:rPr kumimoji="0" lang="en-US" sz="1800" b="1" kern="1200" dirty="0" smtClean="0">
+                          <a:solidFill>
+                            <a:schemeClr val="lt1"/>
+                          </a:solidFill>
+                          <a:latin typeface="+mn-lt"/>
+                          <a:ea typeface="+mn-ea"/>
+                          <a:cs typeface="+mn-cs"/>
+                        </a:rPr>
+                        <a:t>Finish the algorithms</a:t>
+                      </a:r>
                       <a:endParaRPr lang="en-US" sz="1400" dirty="0">
                         <a:effectLst/>
                         <a:latin typeface="Calibri" panose="020F0502020204030204" pitchFamily="34" charset="0"/>
@@ -3809,6 +4666,15 @@
                           <a:spcPts val="0"/>
                         </a:spcAft>
                       </a:pPr>
+                      <a:r>
+                        <a:rPr lang="en-US" sz="1400" dirty="0" smtClean="0">
+                          <a:effectLst/>
+                          <a:latin typeface="Calibri" panose="020F0502020204030204" pitchFamily="34" charset="0"/>
+                          <a:ea typeface="Calibri" panose="020F0502020204030204" pitchFamily="34" charset="0"/>
+                          <a:cs typeface="Times New Roman" panose="02020603050405020304" pitchFamily="18" charset="0"/>
+                        </a:rPr>
+                        <a:t>100%</a:t>
+                      </a:r>
                       <a:endParaRPr lang="en-US" sz="1400" dirty="0">
                         <a:effectLst/>
                         <a:latin typeface="Calibri" panose="020F0502020204030204" pitchFamily="34" charset="0"/>
@@ -3835,6 +4701,15 @@
                           <a:spcPts val="0"/>
                         </a:spcAft>
                       </a:pPr>
+                      <a:r>
+                        <a:rPr lang="en-US" sz="1400" dirty="0" smtClean="0">
+                          <a:effectLst/>
+                          <a:latin typeface="Calibri" panose="020F0502020204030204" pitchFamily="34" charset="0"/>
+                          <a:ea typeface="Calibri" panose="020F0502020204030204" pitchFamily="34" charset="0"/>
+                          <a:cs typeface="Times New Roman" panose="02020603050405020304" pitchFamily="18" charset="0"/>
+                        </a:rPr>
+                        <a:t>100%</a:t>
+                      </a:r>
                       <a:endParaRPr lang="en-US" sz="1400" dirty="0">
                         <a:effectLst/>
                         <a:latin typeface="Calibri" panose="020F0502020204030204" pitchFamily="34" charset="0"/>
@@ -3959,6 +4834,654 @@
                   <a:tcPr marL="68580" marR="68580" marT="0" marB="0"/>
                 </a:tc>
               </a:tr>
+              <a:tr h="796834">
+                <a:tc>
+                  <a:txBody>
+                    <a:bodyPr/>
+                    <a:lstStyle/>
+                    <a:p>
+                      <a:pPr marL="0" marR="0" algn="ctr">
+                        <a:lnSpc>
+                          <a:spcPct val="115000"/>
+                        </a:lnSpc>
+                        <a:spcBef>
+                          <a:spcPts val="0"/>
+                        </a:spcBef>
+                        <a:spcAft>
+                          <a:spcPts val="0"/>
+                        </a:spcAft>
+                      </a:pPr>
+                      <a:r>
+                        <a:rPr kumimoji="0" lang="en-US" sz="1800" b="1" kern="1200" dirty="0" smtClean="0">
+                          <a:solidFill>
+                            <a:schemeClr val="lt1"/>
+                          </a:solidFill>
+                          <a:latin typeface="+mn-lt"/>
+                          <a:ea typeface="+mn-ea"/>
+                          <a:cs typeface="+mn-cs"/>
+                        </a:rPr>
+                        <a:t>Query the database</a:t>
+                      </a:r>
+                      <a:endParaRPr lang="en-US" sz="1400" dirty="0">
+                        <a:effectLst/>
+                        <a:latin typeface="Calibri" panose="020F0502020204030204" pitchFamily="34" charset="0"/>
+                        <a:ea typeface="Calibri" panose="020F0502020204030204" pitchFamily="34" charset="0"/>
+                        <a:cs typeface="Times New Roman" panose="02020603050405020304" pitchFamily="18" charset="0"/>
+                      </a:endParaRPr>
+                    </a:p>
+                  </a:txBody>
+                  <a:tcPr marL="68580" marR="68580" marT="0" marB="0"/>
+                </a:tc>
+                <a:tc>
+                  <a:txBody>
+                    <a:bodyPr/>
+                    <a:lstStyle/>
+                    <a:p>
+                      <a:pPr marL="0" marR="0" algn="ctr">
+                        <a:lnSpc>
+                          <a:spcPct val="115000"/>
+                        </a:lnSpc>
+                        <a:spcBef>
+                          <a:spcPts val="0"/>
+                        </a:spcBef>
+                        <a:spcAft>
+                          <a:spcPts val="0"/>
+                        </a:spcAft>
+                      </a:pPr>
+                      <a:r>
+                        <a:rPr lang="en-US" sz="1400" dirty="0" smtClean="0">
+                          <a:effectLst/>
+                          <a:latin typeface="Calibri" panose="020F0502020204030204" pitchFamily="34" charset="0"/>
+                          <a:ea typeface="Calibri" panose="020F0502020204030204" pitchFamily="34" charset="0"/>
+                          <a:cs typeface="Times New Roman" panose="02020603050405020304" pitchFamily="18" charset="0"/>
+                        </a:rPr>
+                        <a:t>100%</a:t>
+                      </a:r>
+                      <a:endParaRPr lang="en-US" sz="1400" dirty="0">
+                        <a:effectLst/>
+                        <a:latin typeface="Calibri" panose="020F0502020204030204" pitchFamily="34" charset="0"/>
+                        <a:ea typeface="Calibri" panose="020F0502020204030204" pitchFamily="34" charset="0"/>
+                        <a:cs typeface="Times New Roman" panose="02020603050405020304" pitchFamily="18" charset="0"/>
+                      </a:endParaRPr>
+                    </a:p>
+                  </a:txBody>
+                  <a:tcPr marL="68580" marR="68580" marT="0" marB="0"/>
+                </a:tc>
+                <a:tc>
+                  <a:txBody>
+                    <a:bodyPr/>
+                    <a:lstStyle/>
+                    <a:p>
+                      <a:pPr marL="0" marR="0" algn="ctr">
+                        <a:lnSpc>
+                          <a:spcPct val="115000"/>
+                        </a:lnSpc>
+                        <a:spcBef>
+                          <a:spcPts val="0"/>
+                        </a:spcBef>
+                        <a:spcAft>
+                          <a:spcPts val="0"/>
+                        </a:spcAft>
+                      </a:pPr>
+                      <a:endParaRPr lang="en-US" sz="1400" dirty="0">
+                        <a:effectLst/>
+                        <a:latin typeface="Calibri" panose="020F0502020204030204" pitchFamily="34" charset="0"/>
+                        <a:ea typeface="Calibri" panose="020F0502020204030204" pitchFamily="34" charset="0"/>
+                        <a:cs typeface="Times New Roman" panose="02020603050405020304" pitchFamily="18" charset="0"/>
+                      </a:endParaRPr>
+                    </a:p>
+                  </a:txBody>
+                  <a:tcPr marL="68580" marR="68580" marT="0" marB="0"/>
+                </a:tc>
+                <a:tc>
+                  <a:txBody>
+                    <a:bodyPr/>
+                    <a:lstStyle/>
+                    <a:p>
+                      <a:pPr marL="0" marR="0" algn="ctr">
+                        <a:lnSpc>
+                          <a:spcPct val="115000"/>
+                        </a:lnSpc>
+                        <a:spcBef>
+                          <a:spcPts val="0"/>
+                        </a:spcBef>
+                        <a:spcAft>
+                          <a:spcPts val="0"/>
+                        </a:spcAft>
+                      </a:pPr>
+                      <a:r>
+                        <a:rPr lang="en-US" sz="1400" dirty="0" smtClean="0">
+                          <a:effectLst/>
+                          <a:latin typeface="Calibri" panose="020F0502020204030204" pitchFamily="34" charset="0"/>
+                          <a:ea typeface="Calibri" panose="020F0502020204030204" pitchFamily="34" charset="0"/>
+                          <a:cs typeface="Times New Roman" panose="02020603050405020304" pitchFamily="18" charset="0"/>
+                        </a:rPr>
+                        <a:t>100%</a:t>
+                      </a:r>
+                      <a:endParaRPr lang="en-US" sz="1400" dirty="0">
+                        <a:effectLst/>
+                        <a:latin typeface="Calibri" panose="020F0502020204030204" pitchFamily="34" charset="0"/>
+                        <a:ea typeface="Calibri" panose="020F0502020204030204" pitchFamily="34" charset="0"/>
+                        <a:cs typeface="Times New Roman" panose="02020603050405020304" pitchFamily="18" charset="0"/>
+                      </a:endParaRPr>
+                    </a:p>
+                  </a:txBody>
+                  <a:tcPr marL="68580" marR="68580" marT="0" marB="0"/>
+                </a:tc>
+                <a:tc>
+                  <a:txBody>
+                    <a:bodyPr/>
+                    <a:lstStyle/>
+                    <a:p>
+                      <a:pPr marL="0" marR="0" algn="ctr">
+                        <a:lnSpc>
+                          <a:spcPct val="115000"/>
+                        </a:lnSpc>
+                        <a:spcBef>
+                          <a:spcPts val="0"/>
+                        </a:spcBef>
+                        <a:spcAft>
+                          <a:spcPts val="0"/>
+                        </a:spcAft>
+                      </a:pPr>
+                      <a:endParaRPr lang="en-US" sz="1400" dirty="0">
+                        <a:effectLst/>
+                        <a:latin typeface="Calibri" panose="020F0502020204030204" pitchFamily="34" charset="0"/>
+                        <a:ea typeface="Calibri" panose="020F0502020204030204" pitchFamily="34" charset="0"/>
+                        <a:cs typeface="Times New Roman" panose="02020603050405020304" pitchFamily="18" charset="0"/>
+                      </a:endParaRPr>
+                    </a:p>
+                  </a:txBody>
+                  <a:tcPr marL="68580" marR="68580" marT="0" marB="0"/>
+                </a:tc>
+                <a:tc>
+                  <a:txBody>
+                    <a:bodyPr/>
+                    <a:lstStyle/>
+                    <a:p>
+                      <a:pPr marL="0" marR="0" algn="ctr">
+                        <a:lnSpc>
+                          <a:spcPct val="115000"/>
+                        </a:lnSpc>
+                        <a:spcBef>
+                          <a:spcPts val="0"/>
+                        </a:spcBef>
+                        <a:spcAft>
+                          <a:spcPts val="0"/>
+                        </a:spcAft>
+                      </a:pPr>
+                      <a:endParaRPr lang="en-US" sz="1400" dirty="0">
+                        <a:effectLst/>
+                        <a:latin typeface="Calibri" panose="020F0502020204030204" pitchFamily="34" charset="0"/>
+                        <a:ea typeface="Calibri" panose="020F0502020204030204" pitchFamily="34" charset="0"/>
+                        <a:cs typeface="Times New Roman" panose="02020603050405020304" pitchFamily="18" charset="0"/>
+                      </a:endParaRPr>
+                    </a:p>
+                  </a:txBody>
+                  <a:tcPr marL="68580" marR="68580" marT="0" marB="0"/>
+                </a:tc>
+                <a:tc>
+                  <a:txBody>
+                    <a:bodyPr/>
+                    <a:lstStyle/>
+                    <a:p>
+                      <a:pPr marL="0" marR="0" algn="ctr">
+                        <a:lnSpc>
+                          <a:spcPct val="115000"/>
+                        </a:lnSpc>
+                        <a:spcBef>
+                          <a:spcPts val="0"/>
+                        </a:spcBef>
+                        <a:spcAft>
+                          <a:spcPts val="0"/>
+                        </a:spcAft>
+                      </a:pPr>
+                      <a:endParaRPr lang="en-US" sz="1400" dirty="0">
+                        <a:effectLst/>
+                        <a:latin typeface="Calibri" panose="020F0502020204030204" pitchFamily="34" charset="0"/>
+                        <a:ea typeface="Calibri" panose="020F0502020204030204" pitchFamily="34" charset="0"/>
+                        <a:cs typeface="Times New Roman" panose="02020603050405020304" pitchFamily="18" charset="0"/>
+                      </a:endParaRPr>
+                    </a:p>
+                  </a:txBody>
+                  <a:tcPr marL="68580" marR="68580" marT="0" marB="0"/>
+                </a:tc>
+              </a:tr>
+              <a:tr h="796834">
+                <a:tc>
+                  <a:txBody>
+                    <a:bodyPr/>
+                    <a:lstStyle/>
+                    <a:p>
+                      <a:pPr marL="0" marR="0" algn="ctr">
+                        <a:lnSpc>
+                          <a:spcPct val="115000"/>
+                        </a:lnSpc>
+                        <a:spcBef>
+                          <a:spcPts val="0"/>
+                        </a:spcBef>
+                        <a:spcAft>
+                          <a:spcPts val="0"/>
+                        </a:spcAft>
+                      </a:pPr>
+                      <a:r>
+                        <a:rPr kumimoji="0" lang="en-US" sz="1800" b="1" kern="1200" dirty="0" smtClean="0">
+                          <a:solidFill>
+                            <a:schemeClr val="lt1"/>
+                          </a:solidFill>
+                          <a:latin typeface="+mn-lt"/>
+                          <a:ea typeface="+mn-ea"/>
+                          <a:cs typeface="+mn-cs"/>
+                        </a:rPr>
+                        <a:t>Look into multithreading</a:t>
+                      </a:r>
+                      <a:endParaRPr lang="en-US" sz="1400" dirty="0">
+                        <a:effectLst/>
+                        <a:latin typeface="Calibri" panose="020F0502020204030204" pitchFamily="34" charset="0"/>
+                        <a:ea typeface="Calibri" panose="020F0502020204030204" pitchFamily="34" charset="0"/>
+                        <a:cs typeface="Times New Roman" panose="02020603050405020304" pitchFamily="18" charset="0"/>
+                      </a:endParaRPr>
+                    </a:p>
+                  </a:txBody>
+                  <a:tcPr marL="68580" marR="68580" marT="0" marB="0"/>
+                </a:tc>
+                <a:tc>
+                  <a:txBody>
+                    <a:bodyPr/>
+                    <a:lstStyle/>
+                    <a:p>
+                      <a:pPr marL="0" marR="0" algn="ctr">
+                        <a:lnSpc>
+                          <a:spcPct val="115000"/>
+                        </a:lnSpc>
+                        <a:spcBef>
+                          <a:spcPts val="0"/>
+                        </a:spcBef>
+                        <a:spcAft>
+                          <a:spcPts val="0"/>
+                        </a:spcAft>
+                      </a:pPr>
+                      <a:r>
+                        <a:rPr lang="en-US" sz="1400" dirty="0" smtClean="0">
+                          <a:effectLst/>
+                          <a:latin typeface="Calibri" panose="020F0502020204030204" pitchFamily="34" charset="0"/>
+                          <a:ea typeface="Calibri" panose="020F0502020204030204" pitchFamily="34" charset="0"/>
+                          <a:cs typeface="Times New Roman" panose="02020603050405020304" pitchFamily="18" charset="0"/>
+                        </a:rPr>
+                        <a:t>85%</a:t>
+                      </a:r>
+                      <a:endParaRPr lang="en-US" sz="1400" dirty="0">
+                        <a:effectLst/>
+                        <a:latin typeface="Calibri" panose="020F0502020204030204" pitchFamily="34" charset="0"/>
+                        <a:ea typeface="Calibri" panose="020F0502020204030204" pitchFamily="34" charset="0"/>
+                        <a:cs typeface="Times New Roman" panose="02020603050405020304" pitchFamily="18" charset="0"/>
+                      </a:endParaRPr>
+                    </a:p>
+                  </a:txBody>
+                  <a:tcPr marL="68580" marR="68580" marT="0" marB="0"/>
+                </a:tc>
+                <a:tc>
+                  <a:txBody>
+                    <a:bodyPr/>
+                    <a:lstStyle/>
+                    <a:p>
+                      <a:pPr marL="0" marR="0" algn="ctr">
+                        <a:lnSpc>
+                          <a:spcPct val="115000"/>
+                        </a:lnSpc>
+                        <a:spcBef>
+                          <a:spcPts val="0"/>
+                        </a:spcBef>
+                        <a:spcAft>
+                          <a:spcPts val="0"/>
+                        </a:spcAft>
+                      </a:pPr>
+                      <a:endParaRPr lang="en-US" sz="1400" dirty="0">
+                        <a:effectLst/>
+                        <a:latin typeface="Calibri" panose="020F0502020204030204" pitchFamily="34" charset="0"/>
+                        <a:ea typeface="Calibri" panose="020F0502020204030204" pitchFamily="34" charset="0"/>
+                        <a:cs typeface="Times New Roman" panose="02020603050405020304" pitchFamily="18" charset="0"/>
+                      </a:endParaRPr>
+                    </a:p>
+                  </a:txBody>
+                  <a:tcPr marL="68580" marR="68580" marT="0" marB="0"/>
+                </a:tc>
+                <a:tc>
+                  <a:txBody>
+                    <a:bodyPr/>
+                    <a:lstStyle/>
+                    <a:p>
+                      <a:pPr marL="0" marR="0" algn="ctr">
+                        <a:lnSpc>
+                          <a:spcPct val="115000"/>
+                        </a:lnSpc>
+                        <a:spcBef>
+                          <a:spcPts val="0"/>
+                        </a:spcBef>
+                        <a:spcAft>
+                          <a:spcPts val="0"/>
+                        </a:spcAft>
+                      </a:pPr>
+                      <a:endParaRPr lang="en-US" sz="1400" dirty="0">
+                        <a:effectLst/>
+                        <a:latin typeface="Calibri" panose="020F0502020204030204" pitchFamily="34" charset="0"/>
+                        <a:ea typeface="Calibri" panose="020F0502020204030204" pitchFamily="34" charset="0"/>
+                        <a:cs typeface="Times New Roman" panose="02020603050405020304" pitchFamily="18" charset="0"/>
+                      </a:endParaRPr>
+                    </a:p>
+                  </a:txBody>
+                  <a:tcPr marL="68580" marR="68580" marT="0" marB="0"/>
+                </a:tc>
+                <a:tc>
+                  <a:txBody>
+                    <a:bodyPr/>
+                    <a:lstStyle/>
+                    <a:p>
+                      <a:pPr marL="0" marR="0" algn="ctr">
+                        <a:lnSpc>
+                          <a:spcPct val="115000"/>
+                        </a:lnSpc>
+                        <a:spcBef>
+                          <a:spcPts val="0"/>
+                        </a:spcBef>
+                        <a:spcAft>
+                          <a:spcPts val="0"/>
+                        </a:spcAft>
+                      </a:pPr>
+                      <a:r>
+                        <a:rPr lang="en-US" sz="1400" dirty="0" smtClean="0">
+                          <a:effectLst/>
+                          <a:latin typeface="Calibri" panose="020F0502020204030204" pitchFamily="34" charset="0"/>
+                          <a:ea typeface="Calibri" panose="020F0502020204030204" pitchFamily="34" charset="0"/>
+                          <a:cs typeface="Times New Roman" panose="02020603050405020304" pitchFamily="18" charset="0"/>
+                        </a:rPr>
+                        <a:t>30%</a:t>
+                      </a:r>
+                      <a:endParaRPr lang="en-US" sz="1400" dirty="0">
+                        <a:effectLst/>
+                        <a:latin typeface="Calibri" panose="020F0502020204030204" pitchFamily="34" charset="0"/>
+                        <a:ea typeface="Calibri" panose="020F0502020204030204" pitchFamily="34" charset="0"/>
+                        <a:cs typeface="Times New Roman" panose="02020603050405020304" pitchFamily="18" charset="0"/>
+                      </a:endParaRPr>
+                    </a:p>
+                  </a:txBody>
+                  <a:tcPr marL="68580" marR="68580" marT="0" marB="0"/>
+                </a:tc>
+                <a:tc>
+                  <a:txBody>
+                    <a:bodyPr/>
+                    <a:lstStyle/>
+                    <a:p>
+                      <a:pPr marL="0" marR="0" algn="ctr">
+                        <a:lnSpc>
+                          <a:spcPct val="115000"/>
+                        </a:lnSpc>
+                        <a:spcBef>
+                          <a:spcPts val="0"/>
+                        </a:spcBef>
+                        <a:spcAft>
+                          <a:spcPts val="0"/>
+                        </a:spcAft>
+                      </a:pPr>
+                      <a:endParaRPr lang="en-US" sz="1400" dirty="0">
+                        <a:effectLst/>
+                        <a:latin typeface="Calibri" panose="020F0502020204030204" pitchFamily="34" charset="0"/>
+                        <a:ea typeface="Calibri" panose="020F0502020204030204" pitchFamily="34" charset="0"/>
+                        <a:cs typeface="Times New Roman" panose="02020603050405020304" pitchFamily="18" charset="0"/>
+                      </a:endParaRPr>
+                    </a:p>
+                  </a:txBody>
+                  <a:tcPr marL="68580" marR="68580" marT="0" marB="0"/>
+                </a:tc>
+                <a:tc>
+                  <a:txBody>
+                    <a:bodyPr/>
+                    <a:lstStyle/>
+                    <a:p>
+                      <a:pPr marL="0" marR="0" algn="ctr">
+                        <a:lnSpc>
+                          <a:spcPct val="115000"/>
+                        </a:lnSpc>
+                        <a:spcBef>
+                          <a:spcPts val="0"/>
+                        </a:spcBef>
+                        <a:spcAft>
+                          <a:spcPts val="0"/>
+                        </a:spcAft>
+                      </a:pPr>
+                      <a:r>
+                        <a:rPr lang="en-US" sz="1400" dirty="0" smtClean="0">
+                          <a:effectLst/>
+                          <a:latin typeface="Calibri" panose="020F0502020204030204" pitchFamily="34" charset="0"/>
+                          <a:ea typeface="Calibri" panose="020F0502020204030204" pitchFamily="34" charset="0"/>
+                          <a:cs typeface="Times New Roman" panose="02020603050405020304" pitchFamily="18" charset="0"/>
+                        </a:rPr>
+                        <a:t>Implement Semaphore</a:t>
+                      </a:r>
+                      <a:endParaRPr lang="en-US" sz="1400" dirty="0">
+                        <a:effectLst/>
+                        <a:latin typeface="Calibri" panose="020F0502020204030204" pitchFamily="34" charset="0"/>
+                        <a:ea typeface="Calibri" panose="020F0502020204030204" pitchFamily="34" charset="0"/>
+                        <a:cs typeface="Times New Roman" panose="02020603050405020304" pitchFamily="18" charset="0"/>
+                      </a:endParaRPr>
+                    </a:p>
+                  </a:txBody>
+                  <a:tcPr marL="68580" marR="68580" marT="0" marB="0"/>
+                </a:tc>
+              </a:tr>
+              <a:tr h="796834">
+                <a:tc>
+                  <a:txBody>
+                    <a:bodyPr/>
+                    <a:lstStyle/>
+                    <a:p>
+                      <a:pPr marL="0" marR="0" algn="ctr">
+                        <a:lnSpc>
+                          <a:spcPct val="115000"/>
+                        </a:lnSpc>
+                        <a:spcBef>
+                          <a:spcPts val="0"/>
+                        </a:spcBef>
+                        <a:spcAft>
+                          <a:spcPts val="0"/>
+                        </a:spcAft>
+                      </a:pPr>
+                      <a:r>
+                        <a:rPr kumimoji="0" lang="en-US" sz="1800" b="1" kern="1200" dirty="0" smtClean="0">
+                          <a:solidFill>
+                            <a:schemeClr val="lt1"/>
+                          </a:solidFill>
+                          <a:latin typeface="+mn-lt"/>
+                          <a:ea typeface="+mn-ea"/>
+                          <a:cs typeface="+mn-cs"/>
+                        </a:rPr>
+                        <a:t>Implement Excel Parser</a:t>
+                      </a:r>
+                      <a:endParaRPr lang="en-US" sz="1400" dirty="0">
+                        <a:effectLst/>
+                        <a:latin typeface="Calibri" panose="020F0502020204030204" pitchFamily="34" charset="0"/>
+                        <a:ea typeface="Calibri" panose="020F0502020204030204" pitchFamily="34" charset="0"/>
+                        <a:cs typeface="Times New Roman" panose="02020603050405020304" pitchFamily="18" charset="0"/>
+                      </a:endParaRPr>
+                    </a:p>
+                  </a:txBody>
+                  <a:tcPr marL="68580" marR="68580" marT="0" marB="0"/>
+                </a:tc>
+                <a:tc>
+                  <a:txBody>
+                    <a:bodyPr/>
+                    <a:lstStyle/>
+                    <a:p>
+                      <a:pPr marL="0" marR="0" algn="ctr">
+                        <a:lnSpc>
+                          <a:spcPct val="115000"/>
+                        </a:lnSpc>
+                        <a:spcBef>
+                          <a:spcPts val="0"/>
+                        </a:spcBef>
+                        <a:spcAft>
+                          <a:spcPts val="0"/>
+                        </a:spcAft>
+                      </a:pPr>
+                      <a:r>
+                        <a:rPr lang="en-US" sz="1400" dirty="0" smtClean="0">
+                          <a:effectLst/>
+                          <a:latin typeface="Calibri" panose="020F0502020204030204" pitchFamily="34" charset="0"/>
+                          <a:ea typeface="Calibri" panose="020F0502020204030204" pitchFamily="34" charset="0"/>
+                          <a:cs typeface="Times New Roman" panose="02020603050405020304" pitchFamily="18" charset="0"/>
+                        </a:rPr>
+                        <a:t>100%</a:t>
+                      </a:r>
+                      <a:endParaRPr lang="en-US" sz="1400" dirty="0">
+                        <a:effectLst/>
+                        <a:latin typeface="Calibri" panose="020F0502020204030204" pitchFamily="34" charset="0"/>
+                        <a:ea typeface="Calibri" panose="020F0502020204030204" pitchFamily="34" charset="0"/>
+                        <a:cs typeface="Times New Roman" panose="02020603050405020304" pitchFamily="18" charset="0"/>
+                      </a:endParaRPr>
+                    </a:p>
+                  </a:txBody>
+                  <a:tcPr marL="68580" marR="68580" marT="0" marB="0"/>
+                </a:tc>
+                <a:tc>
+                  <a:txBody>
+                    <a:bodyPr/>
+                    <a:lstStyle/>
+                    <a:p>
+                      <a:pPr marL="0" marR="0" algn="ctr">
+                        <a:lnSpc>
+                          <a:spcPct val="115000"/>
+                        </a:lnSpc>
+                        <a:spcBef>
+                          <a:spcPts val="0"/>
+                        </a:spcBef>
+                        <a:spcAft>
+                          <a:spcPts val="0"/>
+                        </a:spcAft>
+                      </a:pPr>
+                      <a:endParaRPr lang="en-US" sz="1400" dirty="0">
+                        <a:effectLst/>
+                        <a:latin typeface="Calibri" panose="020F0502020204030204" pitchFamily="34" charset="0"/>
+                        <a:ea typeface="Calibri" panose="020F0502020204030204" pitchFamily="34" charset="0"/>
+                        <a:cs typeface="Times New Roman" panose="02020603050405020304" pitchFamily="18" charset="0"/>
+                      </a:endParaRPr>
+                    </a:p>
+                  </a:txBody>
+                  <a:tcPr marL="68580" marR="68580" marT="0" marB="0"/>
+                </a:tc>
+                <a:tc>
+                  <a:txBody>
+                    <a:bodyPr/>
+                    <a:lstStyle/>
+                    <a:p>
+                      <a:pPr marL="0" marR="0" algn="ctr">
+                        <a:lnSpc>
+                          <a:spcPct val="115000"/>
+                        </a:lnSpc>
+                        <a:spcBef>
+                          <a:spcPts val="0"/>
+                        </a:spcBef>
+                        <a:spcAft>
+                          <a:spcPts val="0"/>
+                        </a:spcAft>
+                      </a:pPr>
+                      <a:endParaRPr lang="en-US" sz="1400" dirty="0">
+                        <a:effectLst/>
+                        <a:latin typeface="Calibri" panose="020F0502020204030204" pitchFamily="34" charset="0"/>
+                        <a:ea typeface="Calibri" panose="020F0502020204030204" pitchFamily="34" charset="0"/>
+                        <a:cs typeface="Times New Roman" panose="02020603050405020304" pitchFamily="18" charset="0"/>
+                      </a:endParaRPr>
+                    </a:p>
+                  </a:txBody>
+                  <a:tcPr marL="68580" marR="68580" marT="0" marB="0"/>
+                </a:tc>
+                <a:tc>
+                  <a:txBody>
+                    <a:bodyPr/>
+                    <a:lstStyle/>
+                    <a:p>
+                      <a:pPr marL="0" marR="0" algn="ctr">
+                        <a:lnSpc>
+                          <a:spcPct val="115000"/>
+                        </a:lnSpc>
+                        <a:spcBef>
+                          <a:spcPts val="0"/>
+                        </a:spcBef>
+                        <a:spcAft>
+                          <a:spcPts val="0"/>
+                        </a:spcAft>
+                      </a:pPr>
+                      <a:endParaRPr lang="en-US" sz="1400" dirty="0">
+                        <a:effectLst/>
+                        <a:latin typeface="Calibri" panose="020F0502020204030204" pitchFamily="34" charset="0"/>
+                        <a:ea typeface="Calibri" panose="020F0502020204030204" pitchFamily="34" charset="0"/>
+                        <a:cs typeface="Times New Roman" panose="02020603050405020304" pitchFamily="18" charset="0"/>
+                      </a:endParaRPr>
+                    </a:p>
+                  </a:txBody>
+                  <a:tcPr marL="68580" marR="68580" marT="0" marB="0"/>
+                </a:tc>
+                <a:tc>
+                  <a:txBody>
+                    <a:bodyPr/>
+                    <a:lstStyle/>
+                    <a:p>
+                      <a:pPr marL="0" marR="0" algn="ctr">
+                        <a:lnSpc>
+                          <a:spcPct val="115000"/>
+                        </a:lnSpc>
+                        <a:spcBef>
+                          <a:spcPts val="0"/>
+                        </a:spcBef>
+                        <a:spcAft>
+                          <a:spcPts val="0"/>
+                        </a:spcAft>
+                      </a:pPr>
+                      <a:r>
+                        <a:rPr lang="en-US" sz="1400" dirty="0" smtClean="0">
+                          <a:effectLst/>
+                          <a:latin typeface="Calibri" panose="020F0502020204030204" pitchFamily="34" charset="0"/>
+                          <a:ea typeface="Calibri" panose="020F0502020204030204" pitchFamily="34" charset="0"/>
+                          <a:cs typeface="Times New Roman" panose="02020603050405020304" pitchFamily="18" charset="0"/>
+                        </a:rPr>
+                        <a:t>100%</a:t>
+                      </a:r>
+                      <a:endParaRPr lang="en-US" sz="1400" dirty="0">
+                        <a:effectLst/>
+                        <a:latin typeface="Calibri" panose="020F0502020204030204" pitchFamily="34" charset="0"/>
+                        <a:ea typeface="Calibri" panose="020F0502020204030204" pitchFamily="34" charset="0"/>
+                        <a:cs typeface="Times New Roman" panose="02020603050405020304" pitchFamily="18" charset="0"/>
+                      </a:endParaRPr>
+                    </a:p>
+                  </a:txBody>
+                  <a:tcPr marL="68580" marR="68580" marT="0" marB="0"/>
+                </a:tc>
+                <a:tc>
+                  <a:txBody>
+                    <a:bodyPr/>
+                    <a:lstStyle/>
+                    <a:p>
+                      <a:pPr marL="0" marR="0" algn="ctr">
+                        <a:lnSpc>
+                          <a:spcPct val="115000"/>
+                        </a:lnSpc>
+                        <a:spcBef>
+                          <a:spcPts val="0"/>
+                        </a:spcBef>
+                        <a:spcAft>
+                          <a:spcPts val="0"/>
+                        </a:spcAft>
+                      </a:pPr>
+                      <a:endParaRPr lang="en-US" sz="1400" dirty="0">
+                        <a:effectLst/>
+                        <a:latin typeface="Calibri" panose="020F0502020204030204" pitchFamily="34" charset="0"/>
+                        <a:ea typeface="Calibri" panose="020F0502020204030204" pitchFamily="34" charset="0"/>
+                        <a:cs typeface="Times New Roman" panose="02020603050405020304" pitchFamily="18" charset="0"/>
+                      </a:endParaRPr>
+                    </a:p>
+                  </a:txBody>
+                  <a:tcPr marL="68580" marR="68580" marT="0" marB="0"/>
+                </a:tc>
+              </a:tr>
             </a:tbl>
           </a:graphicData>
         </a:graphic>
@@ -3966,7 +5489,7 @@
     </p:spTree>
     <p:extLst>
       <p:ext uri="{BB962C8B-B14F-4D97-AF65-F5344CB8AC3E}">
-        <p14:creationId xmlns:p14="http://schemas.microsoft.com/office/powerpoint/2010/main" val="4270080904"/>
+        <p14:creationId xmlns:p14="http://schemas.microsoft.com/office/powerpoint/2010/main" xmlns="" val="4270080904"/>
       </p:ext>
     </p:extLst>
   </p:cSld>
@@ -4010,15 +5533,7 @@
           <a:p>
             <a:r>
               <a:rPr lang="en-US" dirty="0" smtClean="0"/>
-              <a:t>Milestone </a:t>
-            </a:r>
-            <a:r>
-              <a:rPr lang="en-US" dirty="0" smtClean="0"/>
-              <a:t>3 </a:t>
-            </a:r>
-            <a:r>
-              <a:rPr lang="en-US" dirty="0" smtClean="0"/>
-              <a:t>Accomplishment Summary</a:t>
+              <a:t>Milestone 3 Accomplishment Summary</a:t>
             </a:r>
             <a:endParaRPr lang="en-US" dirty="0"/>
           </a:p>
@@ -4027,7 +5542,7 @@
     </p:spTree>
     <p:extLst>
       <p:ext uri="{BB962C8B-B14F-4D97-AF65-F5344CB8AC3E}">
-        <p14:creationId xmlns:p14="http://schemas.microsoft.com/office/powerpoint/2010/main" val="4270080904"/>
+        <p14:creationId xmlns:p14="http://schemas.microsoft.com/office/powerpoint/2010/main" xmlns="" val="4270080904"/>
       </p:ext>
     </p:extLst>
   </p:cSld>
@@ -4070,8 +5585,8 @@
           <a:lstStyle/>
           <a:p>
             <a:r>
-              <a:rPr lang="en-US" sz="4400" u="sng" dirty="0" smtClean="0"/>
-              <a:t> </a:t>
+              <a:rPr lang="en-US" dirty="0" smtClean="0"/>
+              <a:t>Create the User Forms</a:t>
             </a:r>
             <a:endParaRPr lang="en-US" dirty="0"/>
           </a:p>
@@ -4079,14 +5594,14 @@
       </p:sp>
       <p:sp>
         <p:nvSpPr>
-          <p:cNvPr id="7" name="TextBox 6"/>
+          <p:cNvPr id="3" name="TextBox 2"/>
           <p:cNvSpPr txBox="1"/>
           <p:nvPr/>
         </p:nvSpPr>
         <p:spPr>
           <a:xfrm>
-            <a:off x="406402" y="1451429"/>
-            <a:ext cx="11379198" cy="1231106"/>
+            <a:off x="0" y="1436914"/>
+            <a:ext cx="12192000" cy="4031873"/>
           </a:xfrm>
           <a:prstGeom prst="rect">
             <a:avLst/>
@@ -4099,56 +5614,80 @@
           </a:bodyPr>
           <a:lstStyle/>
           <a:p>
-            <a:r>
-              <a:rPr lang="en-US" sz="2800" dirty="0" smtClean="0"/>
-              <a:t> </a:t>
-            </a:r>
-          </a:p>
-          <a:p>
-            <a:endParaRPr lang="en-US" sz="2800" dirty="0" smtClean="0"/>
-          </a:p>
-          <a:p>
-            <a:endParaRPr lang="en-US" dirty="0"/>
-          </a:p>
-        </p:txBody>
-      </p:sp>
-      <p:sp>
-        <p:nvSpPr>
-          <p:cNvPr id="5" name="TextBox 4"/>
-          <p:cNvSpPr txBox="1"/>
-          <p:nvPr/>
-        </p:nvSpPr>
-        <p:spPr>
-          <a:xfrm>
-            <a:off x="613954" y="1554479"/>
-            <a:ext cx="10896729" cy="861774"/>
-          </a:xfrm>
-          <a:prstGeom prst="rect">
-            <a:avLst/>
-          </a:prstGeom>
-          <a:noFill/>
-        </p:spPr>
-        <p:txBody>
-          <a:bodyPr wrap="square" rtlCol="0">
-            <a:spAutoFit/>
-          </a:bodyPr>
-          <a:lstStyle/>
+            <a:pPr>
+              <a:buFont typeface="Arial" pitchFamily="34" charset="0"/>
+              <a:buChar char="•"/>
+            </a:pPr>
+            <a:r>
+              <a:rPr lang="en-US" sz="3200" dirty="0" smtClean="0"/>
+              <a:t>Take UI </a:t>
+            </a:r>
+            <a:r>
+              <a:rPr lang="en-US" sz="3200" dirty="0" smtClean="0"/>
+              <a:t>design and </a:t>
+            </a:r>
+            <a:r>
+              <a:rPr lang="en-US" sz="3200" dirty="0" smtClean="0"/>
+              <a:t>alter it </a:t>
+            </a:r>
+            <a:r>
+              <a:rPr lang="en-US" sz="3200" dirty="0" smtClean="0"/>
+              <a:t>to resemble the UI design template provided to us by GE. </a:t>
+            </a:r>
+            <a:endParaRPr lang="en-US" sz="3200" dirty="0" smtClean="0"/>
+          </a:p>
+          <a:p>
+            <a:pPr>
+              <a:buFont typeface="Arial" pitchFamily="34" charset="0"/>
+              <a:buChar char="•"/>
+            </a:pPr>
+            <a:endParaRPr lang="en-US" sz="3200" dirty="0" smtClean="0"/>
+          </a:p>
+          <a:p>
+            <a:pPr>
+              <a:buFont typeface="Arial" pitchFamily="34" charset="0"/>
+              <a:buChar char="•"/>
+            </a:pPr>
+            <a:r>
+              <a:rPr lang="en-US" sz="3200" dirty="0" smtClean="0"/>
+              <a:t>Upon </a:t>
+            </a:r>
+            <a:r>
+              <a:rPr lang="en-US" sz="3200" dirty="0" smtClean="0"/>
+              <a:t>initial review, our demo design was a very close match to what GE had in its examples</a:t>
+            </a:r>
+            <a:r>
+              <a:rPr lang="en-US" sz="3200" dirty="0" smtClean="0"/>
+              <a:t>.</a:t>
+            </a:r>
+          </a:p>
           <a:p>
             <a:r>
               <a:rPr lang="en-US" sz="3200" dirty="0" smtClean="0"/>
               <a:t> </a:t>
             </a:r>
-            <a:endParaRPr lang="en-US" sz="3200" dirty="0" smtClean="0"/>
-          </a:p>
-          <a:p>
-            <a:endParaRPr lang="en-US" dirty="0"/>
+          </a:p>
+          <a:p>
+            <a:pPr>
+              <a:buFont typeface="Arial" pitchFamily="34" charset="0"/>
+              <a:buChar char="•"/>
+            </a:pPr>
+            <a:r>
+              <a:rPr lang="en-US" sz="3200" dirty="0" smtClean="0"/>
+              <a:t>We </a:t>
+            </a:r>
+            <a:r>
+              <a:rPr lang="en-US" sz="3200" dirty="0" smtClean="0"/>
+              <a:t>are 70% done with the alterations of the portions that were not a match. </a:t>
+            </a:r>
+            <a:endParaRPr lang="en-US" sz="3200" dirty="0"/>
           </a:p>
         </p:txBody>
       </p:sp>
     </p:spTree>
     <p:extLst>
       <p:ext uri="{BB962C8B-B14F-4D97-AF65-F5344CB8AC3E}">
-        <p14:creationId xmlns:p14="http://schemas.microsoft.com/office/powerpoint/2010/main" val="4270080904"/>
+        <p14:creationId xmlns:p14="http://schemas.microsoft.com/office/powerpoint/2010/main" xmlns="" val="4270080904"/>
       </p:ext>
     </p:extLst>
   </p:cSld>
@@ -4187,14 +5726,12 @@
         </p:nvSpPr>
         <p:spPr/>
         <p:txBody>
-          <a:bodyPr>
-            <a:normAutofit/>
-          </a:bodyPr>
+          <a:bodyPr/>
           <a:lstStyle/>
           <a:p>
             <a:r>
-              <a:rPr lang="en-US" sz="4400" u="sng" dirty="0" smtClean="0"/>
-              <a:t> </a:t>
+              <a:rPr lang="en-US" dirty="0" smtClean="0"/>
+              <a:t>Finish the Algorithms</a:t>
             </a:r>
             <a:endParaRPr lang="en-US" dirty="0"/>
           </a:p>
@@ -4202,14 +5739,14 @@
       </p:sp>
       <p:sp>
         <p:nvSpPr>
-          <p:cNvPr id="5" name="TextBox 4"/>
+          <p:cNvPr id="4" name="TextBox 3"/>
           <p:cNvSpPr txBox="1"/>
           <p:nvPr/>
         </p:nvSpPr>
         <p:spPr>
           <a:xfrm>
-            <a:off x="595085" y="1785258"/>
-            <a:ext cx="10892413" cy="738664"/>
+            <a:off x="0" y="1502228"/>
+            <a:ext cx="12191999" cy="3170099"/>
           </a:xfrm>
           <a:prstGeom prst="rect">
             <a:avLst/>
@@ -4222,53 +5759,39 @@
           </a:bodyPr>
           <a:lstStyle/>
           <a:p>
-            <a:r>
-              <a:rPr lang="en-US" sz="2400" dirty="0" smtClean="0"/>
-              <a:t> </a:t>
-            </a:r>
-          </a:p>
-          <a:p>
-            <a:endParaRPr lang="en-US" dirty="0"/>
-          </a:p>
-        </p:txBody>
-      </p:sp>
-      <p:sp>
-        <p:nvSpPr>
-          <p:cNvPr id="4" name="TextBox 3"/>
-          <p:cNvSpPr txBox="1"/>
-          <p:nvPr/>
-        </p:nvSpPr>
-        <p:spPr>
-          <a:xfrm>
-            <a:off x="391885" y="1489165"/>
-            <a:ext cx="11325497" cy="861774"/>
-          </a:xfrm>
-          <a:prstGeom prst="rect">
-            <a:avLst/>
-          </a:prstGeom>
-          <a:noFill/>
-        </p:spPr>
-        <p:txBody>
-          <a:bodyPr wrap="square" rtlCol="0">
-            <a:spAutoFit/>
-          </a:bodyPr>
-          <a:lstStyle/>
-          <a:p>
-            <a:r>
-              <a:rPr lang="en-US" sz="3200" dirty="0" smtClean="0"/>
-              <a:t> </a:t>
-            </a:r>
-            <a:endParaRPr lang="en-US" sz="3200" dirty="0" smtClean="0"/>
-          </a:p>
-          <a:p>
-            <a:endParaRPr lang="en-US" dirty="0"/>
+            <a:pPr>
+              <a:buFont typeface="Arial" pitchFamily="34" charset="0"/>
+              <a:buChar char="•"/>
+            </a:pPr>
+            <a:r>
+              <a:rPr lang="en-US" sz="4000" dirty="0" smtClean="0"/>
+              <a:t>Added assert statement to ensure the function will never return a negative value</a:t>
+            </a:r>
+          </a:p>
+          <a:p>
+            <a:pPr>
+              <a:buFont typeface="Arial" pitchFamily="34" charset="0"/>
+              <a:buChar char="•"/>
+            </a:pPr>
+            <a:endParaRPr lang="en-US" sz="4000" dirty="0" smtClean="0"/>
+          </a:p>
+          <a:p>
+            <a:pPr>
+              <a:buFont typeface="Arial" pitchFamily="34" charset="0"/>
+              <a:buChar char="•"/>
+            </a:pPr>
+            <a:r>
+              <a:rPr lang="en-US" sz="4000" dirty="0" smtClean="0"/>
+              <a:t>Ensure that the function returns the correct value to the Track Layout class to be stored in the object</a:t>
+            </a:r>
+            <a:endParaRPr lang="en-US" sz="4000" dirty="0"/>
           </a:p>
         </p:txBody>
       </p:sp>
     </p:spTree>
     <p:extLst>
       <p:ext uri="{BB962C8B-B14F-4D97-AF65-F5344CB8AC3E}">
-        <p14:creationId xmlns:p14="http://schemas.microsoft.com/office/powerpoint/2010/main" val="4270080904"/>
+        <p14:creationId xmlns:p14="http://schemas.microsoft.com/office/powerpoint/2010/main" xmlns="" val="4270080904"/>
       </p:ext>
     </p:extLst>
   </p:cSld>
@@ -4310,43 +5833,24 @@
           <a:bodyPr/>
           <a:lstStyle/>
           <a:p>
-            <a:endParaRPr lang="en-US"/>
-          </a:p>
-        </p:txBody>
-      </p:sp>
-      <p:pic>
-        <p:nvPicPr>
-          <p:cNvPr id="4" name="Content Placeholder 3" descr="gegreenmachine.jpg"/>
-          <p:cNvPicPr>
-            <a:picLocks noGrp="1" noChangeAspect="1"/>
-          </p:cNvPicPr>
-          <p:nvPr>
-            <p:ph idx="1"/>
-          </p:nvPr>
-        </p:nvPicPr>
-        <p:blipFill>
-          <a:blip r:embed="rId2" cstate="print"/>
-          <a:stretch>
-            <a:fillRect/>
-          </a:stretch>
-        </p:blipFill>
+            <a:r>
+              <a:rPr lang="en-US" dirty="0" smtClean="0"/>
+              <a:t>Query the Database</a:t>
+            </a:r>
+            <a:endParaRPr lang="en-US" dirty="0"/>
+          </a:p>
+        </p:txBody>
+      </p:sp>
+      <p:sp>
+        <p:nvSpPr>
+          <p:cNvPr id="3" name="TextBox 2"/>
+          <p:cNvSpPr txBox="1"/>
+          <p:nvPr/>
+        </p:nvSpPr>
         <p:spPr>
           <a:xfrm>
-            <a:off x="0" y="1416"/>
-            <a:ext cx="12192000" cy="6856584"/>
-          </a:xfrm>
-        </p:spPr>
-      </p:pic>
-      <p:sp>
-        <p:nvSpPr>
-          <p:cNvPr id="5" name="TextBox 4"/>
-          <p:cNvSpPr txBox="1"/>
-          <p:nvPr/>
-        </p:nvSpPr>
-        <p:spPr>
-          <a:xfrm>
-            <a:off x="6791233" y="190137"/>
-            <a:ext cx="4871847" cy="923330"/>
+            <a:off x="0" y="1319348"/>
+            <a:ext cx="12192000" cy="369332"/>
           </a:xfrm>
           <a:prstGeom prst="rect">
             <a:avLst/>
@@ -4354,31 +5858,23 @@
           <a:noFill/>
         </p:spPr>
         <p:txBody>
-          <a:bodyPr wrap="none" rtlCol="0">
+          <a:bodyPr wrap="square" rtlCol="0">
             <a:spAutoFit/>
           </a:bodyPr>
           <a:lstStyle/>
           <a:p>
-            <a:r>
-              <a:rPr lang="en-US" sz="5400" smtClean="0">
-                <a:solidFill>
-                  <a:schemeClr val="bg1"/>
-                </a:solidFill>
-              </a:rPr>
-              <a:t>Next Milestone</a:t>
-            </a:r>
-            <a:endParaRPr lang="en-US" sz="5400" dirty="0">
-              <a:solidFill>
-                <a:schemeClr val="bg1"/>
-              </a:solidFill>
-            </a:endParaRPr>
+            <a:pPr>
+              <a:buFont typeface="Arial" pitchFamily="34" charset="0"/>
+              <a:buChar char="•"/>
+            </a:pPr>
+            <a:endParaRPr lang="en-US" dirty="0"/>
           </a:p>
         </p:txBody>
       </p:sp>
     </p:spTree>
     <p:extLst>
       <p:ext uri="{BB962C8B-B14F-4D97-AF65-F5344CB8AC3E}">
-        <p14:creationId xmlns:p14="http://schemas.microsoft.com/office/powerpoint/2010/main" val="1202250340"/>
+        <p14:creationId xmlns:p14="http://schemas.microsoft.com/office/powerpoint/2010/main" xmlns="" val="4270080904"/>
       </p:ext>
     </p:extLst>
   </p:cSld>
@@ -4422,17 +5918,18 @@
           <a:p>
             <a:r>
               <a:rPr lang="en-US" dirty="0" smtClean="0"/>
-              <a:t>Milestone </a:t>
-            </a:r>
-            <a:r>
-              <a:rPr lang="en-US" dirty="0" smtClean="0"/>
-              <a:t>4</a:t>
+              <a:t>Look into Multithreading</a:t>
             </a:r>
             <a:endParaRPr lang="en-US" dirty="0"/>
           </a:p>
         </p:txBody>
       </p:sp>
     </p:spTree>
+    <p:extLst>
+      <p:ext uri="{BB962C8B-B14F-4D97-AF65-F5344CB8AC3E}">
+        <p14:creationId xmlns:p14="http://schemas.microsoft.com/office/powerpoint/2010/main" xmlns="" val="4270080904"/>
+      </p:ext>
+    </p:extLst>
   </p:cSld>
   <p:clrMapOvr>
     <a:masterClrMapping/>
@@ -4467,650 +5964,25 @@
             <p:ph type="title"/>
           </p:nvPr>
         </p:nvSpPr>
-        <p:spPr>
-          <a:xfrm>
-            <a:off x="1619794" y="0"/>
-            <a:ext cx="8878388" cy="731520"/>
-          </a:xfrm>
-        </p:spPr>
-        <p:txBody>
-          <a:bodyPr>
-            <a:normAutofit/>
-          </a:bodyPr>
+        <p:spPr/>
+        <p:txBody>
+          <a:bodyPr/>
           <a:lstStyle/>
           <a:p>
             <a:r>
-              <a:rPr lang="en-US" sz="3600" smtClean="0"/>
-              <a:t>Milestone </a:t>
-            </a:r>
-            <a:r>
-              <a:rPr lang="en-US" sz="3600" dirty="0"/>
-              <a:t>4</a:t>
-            </a:r>
-            <a:r>
-              <a:rPr lang="en-US" sz="3600" smtClean="0"/>
-              <a:t> </a:t>
-            </a:r>
-            <a:r>
-              <a:rPr lang="en-US" sz="3600" dirty="0" smtClean="0"/>
-              <a:t>Role Distribution</a:t>
-            </a:r>
-            <a:endParaRPr lang="en-US" sz="3600" dirty="0"/>
-          </a:p>
-        </p:txBody>
-      </p:sp>
-      <p:graphicFrame>
-        <p:nvGraphicFramePr>
-          <p:cNvPr id="4" name="Content Placeholder 3"/>
-          <p:cNvGraphicFramePr>
-            <a:graphicFrameLocks noGrp="1"/>
-          </p:cNvGraphicFramePr>
-          <p:nvPr>
-            <p:ph idx="1"/>
-            <p:extLst>
-              <p:ext uri="{D42A27DB-BD31-4B8C-83A1-F6EECF244321}">
-                <p14:modId xmlns:p14="http://schemas.microsoft.com/office/powerpoint/2010/main" val="1383281811"/>
-              </p:ext>
-            </p:extLst>
-          </p:nvPr>
-        </p:nvGraphicFramePr>
-        <p:xfrm>
-          <a:off x="374469" y="913239"/>
-          <a:ext cx="11373395" cy="5012072"/>
-        </p:xfrm>
-        <a:graphic>
-          <a:graphicData uri="http://schemas.openxmlformats.org/drawingml/2006/table">
-            <a:tbl>
-              <a:tblPr firstRow="1" bandRow="1">
-                <a:tableStyleId>{5C22544A-7EE6-4342-B048-85BDC9FD1C3A}</a:tableStyleId>
-              </a:tblPr>
-              <a:tblGrid>
-                <a:gridCol w="2274679"/>
-                <a:gridCol w="2274679"/>
-                <a:gridCol w="2274679"/>
-                <a:gridCol w="2274679"/>
-                <a:gridCol w="2274679"/>
-              </a:tblGrid>
-              <a:tr h="602052">
-                <a:tc>
-                  <a:txBody>
-                    <a:bodyPr/>
-                    <a:lstStyle/>
-                    <a:p>
-                      <a:pPr marL="0" marR="0" algn="ctr">
-                        <a:spcBef>
-                          <a:spcPts val="0"/>
-                        </a:spcBef>
-                        <a:spcAft>
-                          <a:spcPts val="0"/>
-                        </a:spcAft>
-                      </a:pPr>
-                      <a:r>
-                        <a:rPr lang="en-US" sz="1800" dirty="0">
-                          <a:latin typeface="Calibri"/>
-                          <a:ea typeface="Calibri"/>
-                          <a:cs typeface="Times New Roman"/>
-                        </a:rPr>
-                        <a:t>Task</a:t>
-                      </a:r>
-                    </a:p>
-                  </a:txBody>
-                  <a:tcPr marL="68580" marR="68580" marT="0" marB="0"/>
-                </a:tc>
-                <a:tc>
-                  <a:txBody>
-                    <a:bodyPr/>
-                    <a:lstStyle/>
-                    <a:p>
-                      <a:pPr marL="0" marR="0" algn="ctr">
-                        <a:spcBef>
-                          <a:spcPts val="0"/>
-                        </a:spcBef>
-                        <a:spcAft>
-                          <a:spcPts val="0"/>
-                        </a:spcAft>
-                      </a:pPr>
-                      <a:r>
-                        <a:rPr lang="en-US" sz="1800" dirty="0">
-                          <a:latin typeface="Calibri"/>
-                          <a:ea typeface="Calibri"/>
-                          <a:cs typeface="Times New Roman"/>
-                        </a:rPr>
-                        <a:t>Kenneth Truex</a:t>
-                      </a:r>
-                    </a:p>
-                  </a:txBody>
-                  <a:tcPr marL="68580" marR="68580" marT="0" marB="0"/>
-                </a:tc>
-                <a:tc>
-                  <a:txBody>
-                    <a:bodyPr/>
-                    <a:lstStyle/>
-                    <a:p>
-                      <a:pPr marL="0" marR="0" algn="ctr">
-                        <a:spcBef>
-                          <a:spcPts val="0"/>
-                        </a:spcBef>
-                        <a:spcAft>
-                          <a:spcPts val="0"/>
-                        </a:spcAft>
-                      </a:pPr>
-                      <a:r>
-                        <a:rPr lang="en-US" sz="1800" dirty="0">
-                          <a:latin typeface="Calibri"/>
-                          <a:ea typeface="Calibri"/>
-                          <a:cs typeface="Times New Roman"/>
-                        </a:rPr>
-                        <a:t>Christopher Diebold</a:t>
-                      </a:r>
-                    </a:p>
-                  </a:txBody>
-                  <a:tcPr marL="68580" marR="68580" marT="0" marB="0"/>
-                </a:tc>
-                <a:tc>
-                  <a:txBody>
-                    <a:bodyPr/>
-                    <a:lstStyle/>
-                    <a:p>
-                      <a:pPr marL="0" marR="0" algn="ctr">
-                        <a:spcBef>
-                          <a:spcPts val="0"/>
-                        </a:spcBef>
-                        <a:spcAft>
-                          <a:spcPts val="0"/>
-                        </a:spcAft>
-                      </a:pPr>
-                      <a:r>
-                        <a:rPr lang="en-US" sz="1800" dirty="0">
-                          <a:latin typeface="Calibri"/>
-                          <a:ea typeface="Calibri"/>
-                          <a:cs typeface="Times New Roman"/>
-                        </a:rPr>
-                        <a:t>Chad Mason</a:t>
-                      </a:r>
-                    </a:p>
-                  </a:txBody>
-                  <a:tcPr marL="68580" marR="68580" marT="0" marB="0"/>
-                </a:tc>
-                <a:tc>
-                  <a:txBody>
-                    <a:bodyPr/>
-                    <a:lstStyle/>
-                    <a:p>
-                      <a:pPr marL="0" marR="0" algn="ctr">
-                        <a:spcBef>
-                          <a:spcPts val="0"/>
-                        </a:spcBef>
-                        <a:spcAft>
-                          <a:spcPts val="0"/>
-                        </a:spcAft>
-                      </a:pPr>
-                      <a:r>
-                        <a:rPr lang="en-US" sz="1800" dirty="0">
-                          <a:latin typeface="Calibri"/>
-                          <a:ea typeface="Calibri"/>
-                          <a:cs typeface="Times New Roman"/>
-                        </a:rPr>
-                        <a:t>Zachary McHenry</a:t>
-                      </a:r>
-                    </a:p>
-                  </a:txBody>
-                  <a:tcPr marL="68580" marR="68580" marT="0" marB="0"/>
-                </a:tc>
-              </a:tr>
-              <a:tr h="1102505">
-                <a:tc>
-                  <a:txBody>
-                    <a:bodyPr/>
-                    <a:lstStyle/>
-                    <a:p>
-                      <a:pPr marL="0" marR="0" algn="ctr">
-                        <a:spcBef>
-                          <a:spcPts val="0"/>
-                        </a:spcBef>
-                        <a:spcAft>
-                          <a:spcPts val="0"/>
-                        </a:spcAft>
-                      </a:pPr>
-                      <a:endParaRPr lang="en-US" sz="1600" dirty="0">
-                        <a:latin typeface="Calibri"/>
-                        <a:ea typeface="Calibri"/>
-                        <a:cs typeface="Times New Roman"/>
-                      </a:endParaRPr>
-                    </a:p>
-                  </a:txBody>
-                  <a:tcPr marL="68580" marR="68580" marT="0" marB="0"/>
-                </a:tc>
-                <a:tc>
-                  <a:txBody>
-                    <a:bodyPr/>
-                    <a:lstStyle/>
-                    <a:p>
-                      <a:pPr marL="0" marR="0" algn="ctr">
-                        <a:spcBef>
-                          <a:spcPts val="0"/>
-                        </a:spcBef>
-                        <a:spcAft>
-                          <a:spcPts val="0"/>
-                        </a:spcAft>
-                      </a:pPr>
-                      <a:endParaRPr lang="en-US" sz="1600" dirty="0">
-                        <a:latin typeface="Calibri"/>
-                        <a:ea typeface="Calibri"/>
-                        <a:cs typeface="Times New Roman"/>
-                      </a:endParaRPr>
-                    </a:p>
-                  </a:txBody>
-                  <a:tcPr marL="68580" marR="68580" marT="0" marB="0"/>
-                </a:tc>
-                <a:tc>
-                  <a:txBody>
-                    <a:bodyPr/>
-                    <a:lstStyle/>
-                    <a:p>
-                      <a:pPr marL="0" marR="0" algn="ctr">
-                        <a:spcBef>
-                          <a:spcPts val="0"/>
-                        </a:spcBef>
-                        <a:spcAft>
-                          <a:spcPts val="0"/>
-                        </a:spcAft>
-                      </a:pPr>
-                      <a:endParaRPr lang="en-US" sz="1600" dirty="0">
-                        <a:latin typeface="Calibri"/>
-                        <a:ea typeface="Calibri"/>
-                        <a:cs typeface="Times New Roman"/>
-                      </a:endParaRPr>
-                    </a:p>
-                  </a:txBody>
-                  <a:tcPr marL="68580" marR="68580" marT="0" marB="0"/>
-                </a:tc>
-                <a:tc>
-                  <a:txBody>
-                    <a:bodyPr/>
-                    <a:lstStyle/>
-                    <a:p>
-                      <a:pPr marL="0" marR="0" algn="ctr">
-                        <a:spcBef>
-                          <a:spcPts val="0"/>
-                        </a:spcBef>
-                        <a:spcAft>
-                          <a:spcPts val="0"/>
-                        </a:spcAft>
-                      </a:pPr>
-                      <a:endParaRPr lang="en-US" sz="1600" dirty="0">
-                        <a:latin typeface="Calibri"/>
-                        <a:ea typeface="Calibri"/>
-                        <a:cs typeface="Times New Roman"/>
-                      </a:endParaRPr>
-                    </a:p>
-                  </a:txBody>
-                  <a:tcPr marL="68580" marR="68580" marT="0" marB="0"/>
-                </a:tc>
-                <a:tc>
-                  <a:txBody>
-                    <a:bodyPr/>
-                    <a:lstStyle/>
-                    <a:p>
-                      <a:pPr marL="0" marR="0" algn="ctr">
-                        <a:spcBef>
-                          <a:spcPts val="0"/>
-                        </a:spcBef>
-                        <a:spcAft>
-                          <a:spcPts val="0"/>
-                        </a:spcAft>
-                      </a:pPr>
-                      <a:endParaRPr lang="en-US" sz="1600" dirty="0">
-                        <a:latin typeface="Calibri"/>
-                        <a:ea typeface="Calibri"/>
-                        <a:cs typeface="Times New Roman"/>
-                      </a:endParaRPr>
-                    </a:p>
-                  </a:txBody>
-                  <a:tcPr marL="68580" marR="68580" marT="0" marB="0"/>
-                </a:tc>
-              </a:tr>
-              <a:tr h="1102505">
-                <a:tc>
-                  <a:txBody>
-                    <a:bodyPr/>
-                    <a:lstStyle/>
-                    <a:p>
-                      <a:pPr marL="0" marR="0" algn="ctr">
-                        <a:spcBef>
-                          <a:spcPts val="0"/>
-                        </a:spcBef>
-                        <a:spcAft>
-                          <a:spcPts val="0"/>
-                        </a:spcAft>
-                      </a:pPr>
-                      <a:endParaRPr lang="en-US" sz="1600" dirty="0">
-                        <a:latin typeface="Calibri"/>
-                        <a:ea typeface="Calibri"/>
-                        <a:cs typeface="Times New Roman"/>
-                      </a:endParaRPr>
-                    </a:p>
-                  </a:txBody>
-                  <a:tcPr marL="68580" marR="68580" marT="0" marB="0"/>
-                </a:tc>
-                <a:tc>
-                  <a:txBody>
-                    <a:bodyPr/>
-                    <a:lstStyle/>
-                    <a:p>
-                      <a:pPr marL="0" marR="0" algn="ctr">
-                        <a:spcBef>
-                          <a:spcPts val="0"/>
-                        </a:spcBef>
-                        <a:spcAft>
-                          <a:spcPts val="0"/>
-                        </a:spcAft>
-                      </a:pPr>
-                      <a:endParaRPr lang="en-US" sz="1600" dirty="0">
-                        <a:latin typeface="Calibri"/>
-                        <a:ea typeface="Calibri"/>
-                        <a:cs typeface="Times New Roman"/>
-                      </a:endParaRPr>
-                    </a:p>
-                  </a:txBody>
-                  <a:tcPr marL="68580" marR="68580" marT="0" marB="0"/>
-                </a:tc>
-                <a:tc>
-                  <a:txBody>
-                    <a:bodyPr/>
-                    <a:lstStyle/>
-                    <a:p>
-                      <a:pPr marL="0" marR="0" algn="ctr">
-                        <a:spcBef>
-                          <a:spcPts val="0"/>
-                        </a:spcBef>
-                        <a:spcAft>
-                          <a:spcPts val="0"/>
-                        </a:spcAft>
-                      </a:pPr>
-                      <a:endParaRPr lang="en-US" sz="1600" dirty="0">
-                        <a:latin typeface="Calibri"/>
-                        <a:ea typeface="Calibri"/>
-                        <a:cs typeface="Times New Roman"/>
-                      </a:endParaRPr>
-                    </a:p>
-                  </a:txBody>
-                  <a:tcPr marL="68580" marR="68580" marT="0" marB="0"/>
-                </a:tc>
-                <a:tc>
-                  <a:txBody>
-                    <a:bodyPr/>
-                    <a:lstStyle/>
-                    <a:p>
-                      <a:pPr marL="0" marR="0" algn="ctr">
-                        <a:spcBef>
-                          <a:spcPts val="0"/>
-                        </a:spcBef>
-                        <a:spcAft>
-                          <a:spcPts val="0"/>
-                        </a:spcAft>
-                      </a:pPr>
-                      <a:endParaRPr lang="en-US" sz="1600" dirty="0">
-                        <a:latin typeface="Calibri"/>
-                        <a:ea typeface="Calibri"/>
-                        <a:cs typeface="Times New Roman"/>
-                      </a:endParaRPr>
-                    </a:p>
-                  </a:txBody>
-                  <a:tcPr marL="68580" marR="68580" marT="0" marB="0"/>
-                </a:tc>
-                <a:tc>
-                  <a:txBody>
-                    <a:bodyPr/>
-                    <a:lstStyle/>
-                    <a:p>
-                      <a:pPr marL="0" marR="0" algn="ctr">
-                        <a:spcBef>
-                          <a:spcPts val="0"/>
-                        </a:spcBef>
-                        <a:spcAft>
-                          <a:spcPts val="0"/>
-                        </a:spcAft>
-                      </a:pPr>
-                      <a:endParaRPr lang="en-US" sz="1600" dirty="0">
-                        <a:latin typeface="Calibri"/>
-                        <a:ea typeface="Calibri"/>
-                        <a:cs typeface="Times New Roman"/>
-                      </a:endParaRPr>
-                    </a:p>
-                  </a:txBody>
-                  <a:tcPr marL="68580" marR="68580" marT="0" marB="0"/>
-                </a:tc>
-              </a:tr>
-              <a:tr h="1102505">
-                <a:tc>
-                  <a:txBody>
-                    <a:bodyPr/>
-                    <a:lstStyle/>
-                    <a:p>
-                      <a:pPr marL="0" marR="0" algn="ctr">
-                        <a:spcBef>
-                          <a:spcPts val="0"/>
-                        </a:spcBef>
-                        <a:spcAft>
-                          <a:spcPts val="0"/>
-                        </a:spcAft>
-                      </a:pPr>
-                      <a:endParaRPr lang="en-US" sz="1600" dirty="0">
-                        <a:latin typeface="Calibri"/>
-                        <a:ea typeface="Calibri"/>
-                        <a:cs typeface="Times New Roman"/>
-                      </a:endParaRPr>
-                    </a:p>
-                  </a:txBody>
-                  <a:tcPr marL="68580" marR="68580" marT="0" marB="0"/>
-                </a:tc>
-                <a:tc>
-                  <a:txBody>
-                    <a:bodyPr/>
-                    <a:lstStyle/>
-                    <a:p>
-                      <a:pPr marL="0" marR="0" algn="ctr">
-                        <a:spcBef>
-                          <a:spcPts val="0"/>
-                        </a:spcBef>
-                        <a:spcAft>
-                          <a:spcPts val="0"/>
-                        </a:spcAft>
-                      </a:pPr>
-                      <a:endParaRPr lang="en-US" sz="1600" dirty="0">
-                        <a:latin typeface="Calibri"/>
-                        <a:ea typeface="Calibri"/>
-                        <a:cs typeface="Times New Roman"/>
-                      </a:endParaRPr>
-                    </a:p>
-                  </a:txBody>
-                  <a:tcPr marL="68580" marR="68580" marT="0" marB="0"/>
-                </a:tc>
-                <a:tc>
-                  <a:txBody>
-                    <a:bodyPr/>
-                    <a:lstStyle/>
-                    <a:p>
-                      <a:pPr marL="0" marR="0" algn="ctr">
-                        <a:spcBef>
-                          <a:spcPts val="0"/>
-                        </a:spcBef>
-                        <a:spcAft>
-                          <a:spcPts val="0"/>
-                        </a:spcAft>
-                      </a:pPr>
-                      <a:endParaRPr lang="en-US" sz="1600" dirty="0">
-                        <a:latin typeface="Calibri"/>
-                        <a:ea typeface="Calibri"/>
-                        <a:cs typeface="Times New Roman"/>
-                      </a:endParaRPr>
-                    </a:p>
-                  </a:txBody>
-                  <a:tcPr marL="68580" marR="68580" marT="0" marB="0"/>
-                </a:tc>
-                <a:tc>
-                  <a:txBody>
-                    <a:bodyPr/>
-                    <a:lstStyle/>
-                    <a:p>
-                      <a:pPr marL="0" marR="0" algn="ctr">
-                        <a:spcBef>
-                          <a:spcPts val="0"/>
-                        </a:spcBef>
-                        <a:spcAft>
-                          <a:spcPts val="0"/>
-                        </a:spcAft>
-                      </a:pPr>
-                      <a:endParaRPr lang="en-US" sz="1600" dirty="0">
-                        <a:latin typeface="Calibri"/>
-                        <a:ea typeface="Calibri"/>
-                        <a:cs typeface="Times New Roman"/>
-                      </a:endParaRPr>
-                    </a:p>
-                  </a:txBody>
-                  <a:tcPr marL="68580" marR="68580" marT="0" marB="0"/>
-                </a:tc>
-                <a:tc>
-                  <a:txBody>
-                    <a:bodyPr/>
-                    <a:lstStyle/>
-                    <a:p>
-                      <a:pPr marL="0" marR="0" algn="ctr">
-                        <a:spcBef>
-                          <a:spcPts val="0"/>
-                        </a:spcBef>
-                        <a:spcAft>
-                          <a:spcPts val="0"/>
-                        </a:spcAft>
-                      </a:pPr>
-                      <a:endParaRPr lang="en-US" sz="1600" dirty="0">
-                        <a:latin typeface="Calibri"/>
-                        <a:ea typeface="Calibri"/>
-                        <a:cs typeface="Times New Roman"/>
-                      </a:endParaRPr>
-                    </a:p>
-                  </a:txBody>
-                  <a:tcPr marL="68580" marR="68580" marT="0" marB="0"/>
-                </a:tc>
-              </a:tr>
-              <a:tr h="1102505">
-                <a:tc>
-                  <a:txBody>
-                    <a:bodyPr/>
-                    <a:lstStyle/>
-                    <a:p>
-                      <a:pPr marL="0" marR="0" algn="ctr">
-                        <a:spcBef>
-                          <a:spcPts val="0"/>
-                        </a:spcBef>
-                        <a:spcAft>
-                          <a:spcPts val="0"/>
-                        </a:spcAft>
-                      </a:pPr>
-                      <a:endParaRPr lang="en-US" sz="1600" dirty="0">
-                        <a:latin typeface="Calibri"/>
-                        <a:ea typeface="Calibri"/>
-                        <a:cs typeface="Times New Roman"/>
-                      </a:endParaRPr>
-                    </a:p>
-                  </a:txBody>
-                  <a:tcPr marL="68580" marR="68580" marT="0" marB="0"/>
-                </a:tc>
-                <a:tc>
-                  <a:txBody>
-                    <a:bodyPr/>
-                    <a:lstStyle/>
-                    <a:p>
-                      <a:pPr marL="0" marR="0" algn="ctr">
-                        <a:spcBef>
-                          <a:spcPts val="0"/>
-                        </a:spcBef>
-                        <a:spcAft>
-                          <a:spcPts val="0"/>
-                        </a:spcAft>
-                      </a:pPr>
-                      <a:endParaRPr lang="en-US" sz="1600" dirty="0">
-                        <a:latin typeface="Calibri"/>
-                        <a:ea typeface="Calibri"/>
-                        <a:cs typeface="Times New Roman"/>
-                      </a:endParaRPr>
-                    </a:p>
-                  </a:txBody>
-                  <a:tcPr marL="68580" marR="68580" marT="0" marB="0"/>
-                </a:tc>
-                <a:tc>
-                  <a:txBody>
-                    <a:bodyPr/>
-                    <a:lstStyle/>
-                    <a:p>
-                      <a:pPr marL="0" marR="0" algn="ctr">
-                        <a:spcBef>
-                          <a:spcPts val="0"/>
-                        </a:spcBef>
-                        <a:spcAft>
-                          <a:spcPts val="0"/>
-                        </a:spcAft>
-                      </a:pPr>
-                      <a:endParaRPr lang="en-US" sz="1600" dirty="0">
-                        <a:latin typeface="Calibri"/>
-                        <a:ea typeface="Calibri"/>
-                        <a:cs typeface="Times New Roman"/>
-                      </a:endParaRPr>
-                    </a:p>
-                  </a:txBody>
-                  <a:tcPr marL="68580" marR="68580" marT="0" marB="0"/>
-                </a:tc>
-                <a:tc>
-                  <a:txBody>
-                    <a:bodyPr/>
-                    <a:lstStyle/>
-                    <a:p>
-                      <a:pPr marL="0" marR="0" algn="ctr">
-                        <a:spcBef>
-                          <a:spcPts val="0"/>
-                        </a:spcBef>
-                        <a:spcAft>
-                          <a:spcPts val="0"/>
-                        </a:spcAft>
-                      </a:pPr>
-                      <a:endParaRPr lang="en-US" sz="1600" dirty="0">
-                        <a:latin typeface="Calibri"/>
-                        <a:ea typeface="Calibri"/>
-                        <a:cs typeface="Times New Roman"/>
-                      </a:endParaRPr>
-                    </a:p>
-                  </a:txBody>
-                  <a:tcPr marL="68580" marR="68580" marT="0" marB="0"/>
-                </a:tc>
-                <a:tc>
-                  <a:txBody>
-                    <a:bodyPr/>
-                    <a:lstStyle/>
-                    <a:p>
-                      <a:pPr marL="0" marR="0" algn="ctr">
-                        <a:spcBef>
-                          <a:spcPts val="0"/>
-                        </a:spcBef>
-                        <a:spcAft>
-                          <a:spcPts val="0"/>
-                        </a:spcAft>
-                      </a:pPr>
-                      <a:endParaRPr lang="en-US" sz="1600" dirty="0">
-                        <a:latin typeface="Calibri"/>
-                        <a:ea typeface="Calibri"/>
-                        <a:cs typeface="Times New Roman"/>
-                      </a:endParaRPr>
-                    </a:p>
-                  </a:txBody>
-                  <a:tcPr marL="68580" marR="68580" marT="0" marB="0"/>
-                </a:tc>
-              </a:tr>
-            </a:tbl>
-          </a:graphicData>
-        </a:graphic>
-      </p:graphicFrame>
+              <a:rPr lang="en-US" dirty="0" smtClean="0"/>
+              <a:t>Implement Excel Parser</a:t>
+            </a:r>
+            <a:endParaRPr lang="en-US" dirty="0"/>
+          </a:p>
+        </p:txBody>
+      </p:sp>
     </p:spTree>
+    <p:extLst>
+      <p:ext uri="{BB962C8B-B14F-4D97-AF65-F5344CB8AC3E}">
+        <p14:creationId xmlns:p14="http://schemas.microsoft.com/office/powerpoint/2010/main" xmlns="" val="4270080904"/>
+      </p:ext>
+    </p:extLst>
   </p:cSld>
   <p:clrMapOvr>
     <a:masterClrMapping/>
@@ -5135,9 +6007,28 @@
           <a:chExt cx="0" cy="0"/>
         </a:xfrm>
       </p:grpSpPr>
+      <p:sp>
+        <p:nvSpPr>
+          <p:cNvPr id="2" name="Title 1"/>
+          <p:cNvSpPr>
+            <a:spLocks noGrp="1"/>
+          </p:cNvSpPr>
+          <p:nvPr>
+            <p:ph type="title"/>
+          </p:nvPr>
+        </p:nvSpPr>
+        <p:spPr/>
+        <p:txBody>
+          <a:bodyPr/>
+          <a:lstStyle/>
+          <a:p>
+            <a:endParaRPr lang="en-US"/>
+          </a:p>
+        </p:txBody>
+      </p:sp>
       <p:pic>
         <p:nvPicPr>
-          <p:cNvPr id="6" name="Content Placeholder 5" descr="getrains3.jpg"/>
+          <p:cNvPr id="4" name="Content Placeholder 3" descr="gegreenmachine.jpg"/>
           <p:cNvPicPr>
             <a:picLocks noGrp="1" noChangeAspect="1"/>
           </p:cNvPicPr>
@@ -5153,21 +6044,21 @@
         </p:blipFill>
         <p:spPr>
           <a:xfrm>
-            <a:off x="22706" y="5871"/>
-            <a:ext cx="12169294" cy="6794471"/>
+            <a:off x="0" y="1416"/>
+            <a:ext cx="12192000" cy="6856584"/>
           </a:xfrm>
         </p:spPr>
       </p:pic>
       <p:sp>
         <p:nvSpPr>
-          <p:cNvPr id="7" name="TextBox 6"/>
+          <p:cNvPr id="5" name="TextBox 4"/>
           <p:cNvSpPr txBox="1"/>
           <p:nvPr/>
         </p:nvSpPr>
         <p:spPr>
           <a:xfrm>
-            <a:off x="169818" y="195943"/>
-            <a:ext cx="5081840" cy="923330"/>
+            <a:off x="6791233" y="190137"/>
+            <a:ext cx="4871847" cy="923330"/>
           </a:xfrm>
           <a:prstGeom prst="rect">
             <a:avLst/>
@@ -5181,12 +6072,12 @@
           <a:lstStyle/>
           <a:p>
             <a:r>
-              <a:rPr lang="en-US" sz="5400" dirty="0" smtClean="0">
+              <a:rPr lang="en-US" sz="5400" smtClean="0">
                 <a:solidFill>
                   <a:schemeClr val="bg1"/>
                 </a:solidFill>
               </a:rPr>
-              <a:t>Any Questions?</a:t>
+              <a:t>Next Milestone</a:t>
             </a:r>
             <a:endParaRPr lang="en-US" sz="5400" dirty="0">
               <a:solidFill>
@@ -5197,6 +6088,11 @@
         </p:txBody>
       </p:sp>
     </p:spTree>
+    <p:extLst>
+      <p:ext uri="{BB962C8B-B14F-4D97-AF65-F5344CB8AC3E}">
+        <p14:creationId xmlns:p14="http://schemas.microsoft.com/office/powerpoint/2010/main" xmlns="" val="1202250340"/>
+      </p:ext>
+    </p:extLst>
   </p:cSld>
   <p:clrMapOvr>
     <a:masterClrMapping/>

</xml_diff>

<commit_message>
updated documents for presentation
</commit_message>
<xml_diff>
--- a/Documents/Presentations/Milestone 3 presentation.pptx
+++ b/Documents/Presentations/Milestone 3 presentation.pptx
@@ -117,7 +117,7 @@
   </p:defaultTextStyle>
   <p:extLst>
     <p:ext uri="{EFAFB233-063F-42B5-8137-9DF3F51BA10A}">
-      <p15:sldGuideLst xmlns:p15="http://schemas.microsoft.com/office/powerpoint/2012/main" xmlns="">
+      <p15:sldGuideLst xmlns:p15="http://schemas.microsoft.com/office/powerpoint/2012/main">
         <p15:guide id="1" orient="horz" pos="2160">
           <p15:clr>
             <a:srgbClr val="A4A3A4"/>
@@ -3242,7 +3242,7 @@
     </p:spTree>
     <p:extLst>
       <p:ext uri="{BB962C8B-B14F-4D97-AF65-F5344CB8AC3E}">
-        <p14:creationId xmlns:p14="http://schemas.microsoft.com/office/powerpoint/2010/main" xmlns="" val="515178540"/>
+        <p14:creationId xmlns:p14="http://schemas.microsoft.com/office/powerpoint/2010/main" val="515178540"/>
       </p:ext>
     </p:extLst>
   </p:cSld>
@@ -3369,7 +3369,7 @@
             <p:ph idx="1"/>
             <p:extLst>
               <p:ext uri="{D42A27DB-BD31-4B8C-83A1-F6EECF244321}">
-                <p14:modId xmlns:p14="http://schemas.microsoft.com/office/powerpoint/2010/main" xmlns="" val="1383281811"/>
+                <p14:modId xmlns:p14="http://schemas.microsoft.com/office/powerpoint/2010/main" val="1383281811"/>
               </p:ext>
             </p:extLst>
           </p:nvPr>
@@ -4114,7 +4114,7 @@
             <p:ph idx="1"/>
             <p:extLst>
               <p:ext uri="{D42A27DB-BD31-4B8C-83A1-F6EECF244321}">
-                <p14:modId xmlns:p14="http://schemas.microsoft.com/office/powerpoint/2010/main" xmlns="" val="4218020183"/>
+                <p14:modId xmlns:p14="http://schemas.microsoft.com/office/powerpoint/2010/main" val="4218020183"/>
               </p:ext>
             </p:extLst>
           </p:nvPr>
@@ -5489,7 +5489,7 @@
     </p:spTree>
     <p:extLst>
       <p:ext uri="{BB962C8B-B14F-4D97-AF65-F5344CB8AC3E}">
-        <p14:creationId xmlns:p14="http://schemas.microsoft.com/office/powerpoint/2010/main" xmlns="" val="4270080904"/>
+        <p14:creationId xmlns:p14="http://schemas.microsoft.com/office/powerpoint/2010/main" val="4270080904"/>
       </p:ext>
     </p:extLst>
   </p:cSld>
@@ -5542,7 +5542,7 @@
     </p:spTree>
     <p:extLst>
       <p:ext uri="{BB962C8B-B14F-4D97-AF65-F5344CB8AC3E}">
-        <p14:creationId xmlns:p14="http://schemas.microsoft.com/office/powerpoint/2010/main" xmlns="" val="4270080904"/>
+        <p14:creationId xmlns:p14="http://schemas.microsoft.com/office/powerpoint/2010/main" val="4270080904"/>
       </p:ext>
     </p:extLst>
   </p:cSld>
@@ -5620,21 +5620,8 @@
             </a:pPr>
             <a:r>
               <a:rPr lang="en-US" sz="3200" dirty="0" smtClean="0"/>
-              <a:t>Take UI </a:t>
-            </a:r>
-            <a:r>
-              <a:rPr lang="en-US" sz="3200" dirty="0" smtClean="0"/>
-              <a:t>design and </a:t>
-            </a:r>
-            <a:r>
-              <a:rPr lang="en-US" sz="3200" dirty="0" smtClean="0"/>
-              <a:t>alter it </a:t>
-            </a:r>
-            <a:r>
-              <a:rPr lang="en-US" sz="3200" dirty="0" smtClean="0"/>
-              <a:t>to resemble the UI design template provided to us by GE. </a:t>
-            </a:r>
-            <a:endParaRPr lang="en-US" sz="3200" dirty="0" smtClean="0"/>
+              <a:t>Take UI design and alter it to resemble the UI design template provided to us by GE. </a:t>
+            </a:r>
           </a:p>
           <a:p>
             <a:pPr>
@@ -5650,15 +5637,7 @@
             </a:pPr>
             <a:r>
               <a:rPr lang="en-US" sz="3200" dirty="0" smtClean="0"/>
-              <a:t>Upon </a:t>
-            </a:r>
-            <a:r>
-              <a:rPr lang="en-US" sz="3200" dirty="0" smtClean="0"/>
-              <a:t>initial review, our demo design was a very close match to what GE had in its examples</a:t>
-            </a:r>
-            <a:r>
-              <a:rPr lang="en-US" sz="3200" dirty="0" smtClean="0"/>
-              <a:t>.</a:t>
+              <a:t>Upon initial review, our demo design was a very close match to what GE had in its examples.</a:t>
             </a:r>
           </a:p>
           <a:p>
@@ -5674,11 +5653,7 @@
             </a:pPr>
             <a:r>
               <a:rPr lang="en-US" sz="3200" dirty="0" smtClean="0"/>
-              <a:t>We </a:t>
-            </a:r>
-            <a:r>
-              <a:rPr lang="en-US" sz="3200" dirty="0" smtClean="0"/>
-              <a:t>are 70% done with the alterations of the portions that were not a match. </a:t>
+              <a:t>We are 70% done with the alterations of the portions that were not a match. </a:t>
             </a:r>
             <a:endParaRPr lang="en-US" sz="3200" dirty="0"/>
           </a:p>
@@ -5687,7 +5662,7 @@
     </p:spTree>
     <p:extLst>
       <p:ext uri="{BB962C8B-B14F-4D97-AF65-F5344CB8AC3E}">
-        <p14:creationId xmlns:p14="http://schemas.microsoft.com/office/powerpoint/2010/main" xmlns="" val="4270080904"/>
+        <p14:creationId xmlns:p14="http://schemas.microsoft.com/office/powerpoint/2010/main" val="4270080904"/>
       </p:ext>
     </p:extLst>
   </p:cSld>
@@ -5791,7 +5766,7 @@
     </p:spTree>
     <p:extLst>
       <p:ext uri="{BB962C8B-B14F-4D97-AF65-F5344CB8AC3E}">
-        <p14:creationId xmlns:p14="http://schemas.microsoft.com/office/powerpoint/2010/main" xmlns="" val="4270080904"/>
+        <p14:creationId xmlns:p14="http://schemas.microsoft.com/office/powerpoint/2010/main" val="4270080904"/>
       </p:ext>
     </p:extLst>
   </p:cSld>
@@ -5850,7 +5825,7 @@
         <p:spPr>
           <a:xfrm>
             <a:off x="0" y="1319348"/>
-            <a:ext cx="12192000" cy="369332"/>
+            <a:ext cx="12192000" cy="1477328"/>
           </a:xfrm>
           <a:prstGeom prst="rect">
             <a:avLst/>
@@ -5867,14 +5842,42 @@
               <a:buFont typeface="Arial" pitchFamily="34" charset="0"/>
               <a:buChar char="•"/>
             </a:pPr>
-            <a:endParaRPr lang="en-US" dirty="0"/>
+            <a:r>
+              <a:rPr lang="en-US" dirty="0" smtClean="0"/>
+              <a:t> Finished implementing and testing the insert, remove, update, and find functions for track and track segments objects</a:t>
+            </a:r>
+          </a:p>
+          <a:p>
+            <a:pPr>
+              <a:buFont typeface="Arial" pitchFamily="34" charset="0"/>
+              <a:buChar char="•"/>
+            </a:pPr>
+            <a:r>
+              <a:rPr lang="en-US" dirty="0" smtClean="0"/>
+              <a:t>Tested these functions by querying the database using MySQL Workbench and then querying in code and manually verifying the results. I tested valid and invalid data ensuring that all exception handling was working correctly. </a:t>
+            </a:r>
+          </a:p>
+          <a:p>
+            <a:pPr>
+              <a:buFont typeface="Arial" pitchFamily="34" charset="0"/>
+              <a:buChar char="•"/>
+            </a:pPr>
+            <a:r>
+              <a:rPr lang="en-US" dirty="0" smtClean="0"/>
+              <a:t>With the backend being mostly finished I will be moving to a testing role in </a:t>
+            </a:r>
+            <a:r>
+              <a:rPr lang="en-US" smtClean="0"/>
+              <a:t>the future. </a:t>
+            </a:r>
+            <a:endParaRPr lang="en-US" dirty="0" smtClean="0"/>
           </a:p>
         </p:txBody>
       </p:sp>
     </p:spTree>
     <p:extLst>
       <p:ext uri="{BB962C8B-B14F-4D97-AF65-F5344CB8AC3E}">
-        <p14:creationId xmlns:p14="http://schemas.microsoft.com/office/powerpoint/2010/main" xmlns="" val="4270080904"/>
+        <p14:creationId xmlns:p14="http://schemas.microsoft.com/office/powerpoint/2010/main" val="4270080904"/>
       </p:ext>
     </p:extLst>
   </p:cSld>
@@ -5927,7 +5930,7 @@
     </p:spTree>
     <p:extLst>
       <p:ext uri="{BB962C8B-B14F-4D97-AF65-F5344CB8AC3E}">
-        <p14:creationId xmlns:p14="http://schemas.microsoft.com/office/powerpoint/2010/main" xmlns="" val="4270080904"/>
+        <p14:creationId xmlns:p14="http://schemas.microsoft.com/office/powerpoint/2010/main" val="4270080904"/>
       </p:ext>
     </p:extLst>
   </p:cSld>
@@ -5980,7 +5983,7 @@
     </p:spTree>
     <p:extLst>
       <p:ext uri="{BB962C8B-B14F-4D97-AF65-F5344CB8AC3E}">
-        <p14:creationId xmlns:p14="http://schemas.microsoft.com/office/powerpoint/2010/main" xmlns="" val="4270080904"/>
+        <p14:creationId xmlns:p14="http://schemas.microsoft.com/office/powerpoint/2010/main" val="4270080904"/>
       </p:ext>
     </p:extLst>
   </p:cSld>
@@ -6090,7 +6093,7 @@
     </p:spTree>
     <p:extLst>
       <p:ext uri="{BB962C8B-B14F-4D97-AF65-F5344CB8AC3E}">
-        <p14:creationId xmlns:p14="http://schemas.microsoft.com/office/powerpoint/2010/main" xmlns="" val="1202250340"/>
+        <p14:creationId xmlns:p14="http://schemas.microsoft.com/office/powerpoint/2010/main" val="1202250340"/>
       </p:ext>
     </p:extLst>
   </p:cSld>

</xml_diff>

<commit_message>
Began to change the Tracksegment.cs to having list. Converted the SDP to a .docx. Added a 2Dcamera class so we can now move around the trackview.Still needs to be tweaked though.
</commit_message>
<xml_diff>
--- a/Documents/Presentations/Milestone 3 presentation.pptx
+++ b/Documents/Presentations/Milestone 3 presentation.pptx
@@ -117,7 +117,7 @@
   </p:defaultTextStyle>
   <p:extLst>
     <p:ext uri="{EFAFB233-063F-42B5-8137-9DF3F51BA10A}">
-      <p15:sldGuideLst xmlns="" xmlns:p15="http://schemas.microsoft.com/office/powerpoint/2012/main">
+      <p15:sldGuideLst xmlns:p15="http://schemas.microsoft.com/office/powerpoint/2012/main">
         <p15:guide id="1" orient="horz" pos="2160">
           <p15:clr>
             <a:srgbClr val="A4A3A4"/>
@@ -246,7 +246,7 @@
             <a:fld id="{3F35B033-0387-4885-861A-442D43D51E29}" type="datetimeFigureOut">
               <a:rPr lang="en-US" smtClean="0"/>
               <a:pPr/>
-              <a:t>4/16/2014</a:t>
+              <a:t>4/23/2014</a:t>
             </a:fld>
             <a:endParaRPr lang="en-US"/>
           </a:p>
@@ -474,7 +474,7 @@
             <a:fld id="{3F35B033-0387-4885-861A-442D43D51E29}" type="datetimeFigureOut">
               <a:rPr lang="en-US" smtClean="0"/>
               <a:pPr/>
-              <a:t>4/16/2014</a:t>
+              <a:t>4/23/2014</a:t>
             </a:fld>
             <a:endParaRPr lang="en-US"/>
           </a:p>
@@ -651,7 +651,7 @@
             <a:fld id="{3F35B033-0387-4885-861A-442D43D51E29}" type="datetimeFigureOut">
               <a:rPr lang="en-US" smtClean="0"/>
               <a:pPr/>
-              <a:t>4/16/2014</a:t>
+              <a:t>4/23/2014</a:t>
             </a:fld>
             <a:endParaRPr lang="en-US"/>
           </a:p>
@@ -818,7 +818,7 @@
             <a:fld id="{3F35B033-0387-4885-861A-442D43D51E29}" type="datetimeFigureOut">
               <a:rPr lang="en-US" smtClean="0"/>
               <a:pPr/>
-              <a:t>4/16/2014</a:t>
+              <a:t>4/23/2014</a:t>
             </a:fld>
             <a:endParaRPr lang="en-US"/>
           </a:p>
@@ -1064,7 +1064,7 @@
             <a:fld id="{3F35B033-0387-4885-861A-442D43D51E29}" type="datetimeFigureOut">
               <a:rPr lang="en-US" smtClean="0"/>
               <a:pPr/>
-              <a:t>4/16/2014</a:t>
+              <a:t>4/23/2014</a:t>
             </a:fld>
             <a:endParaRPr lang="en-US"/>
           </a:p>
@@ -1330,7 +1330,7 @@
             <a:fld id="{3F35B033-0387-4885-861A-442D43D51E29}" type="datetimeFigureOut">
               <a:rPr lang="en-US" smtClean="0"/>
               <a:pPr/>
-              <a:t>4/16/2014</a:t>
+              <a:t>4/23/2014</a:t>
             </a:fld>
             <a:endParaRPr lang="en-US"/>
           </a:p>
@@ -1706,7 +1706,7 @@
             <a:fld id="{3F35B033-0387-4885-861A-442D43D51E29}" type="datetimeFigureOut">
               <a:rPr lang="en-US" smtClean="0"/>
               <a:pPr/>
-              <a:t>4/16/2014</a:t>
+              <a:t>4/23/2014</a:t>
             </a:fld>
             <a:endParaRPr lang="en-US"/>
           </a:p>
@@ -1821,7 +1821,7 @@
             <a:fld id="{3F35B033-0387-4885-861A-442D43D51E29}" type="datetimeFigureOut">
               <a:rPr lang="en-US" smtClean="0"/>
               <a:pPr/>
-              <a:t>4/16/2014</a:t>
+              <a:t>4/23/2014</a:t>
             </a:fld>
             <a:endParaRPr lang="en-US"/>
           </a:p>
@@ -1913,7 +1913,7 @@
             <a:fld id="{3F35B033-0387-4885-861A-442D43D51E29}" type="datetimeFigureOut">
               <a:rPr lang="en-US" smtClean="0"/>
               <a:pPr/>
-              <a:t>4/16/2014</a:t>
+              <a:t>4/23/2014</a:t>
             </a:fld>
             <a:endParaRPr lang="en-US"/>
           </a:p>
@@ -2173,7 +2173,7 @@
             <a:fld id="{3F35B033-0387-4885-861A-442D43D51E29}" type="datetimeFigureOut">
               <a:rPr lang="en-US" smtClean="0"/>
               <a:pPr/>
-              <a:t>4/16/2014</a:t>
+              <a:t>4/23/2014</a:t>
             </a:fld>
             <a:endParaRPr lang="en-US"/>
           </a:p>
@@ -2439,7 +2439,7 @@
             <a:fld id="{3F35B033-0387-4885-861A-442D43D51E29}" type="datetimeFigureOut">
               <a:rPr lang="en-US" smtClean="0"/>
               <a:pPr/>
-              <a:t>4/16/2014</a:t>
+              <a:t>4/23/2014</a:t>
             </a:fld>
             <a:endParaRPr lang="en-US"/>
           </a:p>
@@ -2658,7 +2658,7 @@
             <a:fld id="{3F35B033-0387-4885-861A-442D43D51E29}" type="datetimeFigureOut">
               <a:rPr lang="en-US" smtClean="0"/>
               <a:pPr/>
-              <a:t>4/16/2014</a:t>
+              <a:t>4/23/2014</a:t>
             </a:fld>
             <a:endParaRPr lang="en-US"/>
           </a:p>
@@ -3242,7 +3242,7 @@
     </p:spTree>
     <p:extLst>
       <p:ext uri="{BB962C8B-B14F-4D97-AF65-F5344CB8AC3E}">
-        <p14:creationId xmlns="" xmlns:p14="http://schemas.microsoft.com/office/powerpoint/2010/main" val="515178540"/>
+        <p14:creationId xmlns:p14="http://schemas.microsoft.com/office/powerpoint/2010/main" val="515178540"/>
       </p:ext>
     </p:extLst>
   </p:cSld>
@@ -3286,7 +3286,11 @@
           <a:p>
             <a:r>
               <a:rPr lang="en-US" dirty="0" smtClean="0"/>
-              <a:t>Milestone 4</a:t>
+              <a:t>Milestone </a:t>
+            </a:r>
+            <a:r>
+              <a:rPr lang="en-US" dirty="0" smtClean="0"/>
+              <a:t>3.5</a:t>
             </a:r>
             <a:endParaRPr lang="en-US" dirty="0"/>
           </a:p>
@@ -3340,20 +3344,16 @@
           <a:lstStyle/>
           <a:p>
             <a:r>
-              <a:rPr lang="en-US" sz="3600" smtClean="0"/>
+              <a:rPr lang="en-US" sz="3600" dirty="0" smtClean="0"/>
               <a:t>Milestone </a:t>
             </a:r>
             <a:r>
-              <a:rPr lang="en-US" sz="3600" dirty="0"/>
-              <a:t>4</a:t>
-            </a:r>
-            <a:r>
-              <a:rPr lang="en-US" sz="3600" smtClean="0"/>
-              <a:t> </a:t>
-            </a:r>
-            <a:r>
               <a:rPr lang="en-US" sz="3600" dirty="0" smtClean="0"/>
-              <a:t>Role Distribution</a:t>
+              <a:t>3.5 Role </a:t>
+            </a:r>
+            <a:r>
+              <a:rPr lang="en-US" sz="3600" dirty="0" smtClean="0"/>
+              <a:t>Distribution</a:t>
             </a:r>
             <a:endParaRPr lang="en-US" sz="3600" dirty="0"/>
           </a:p>
@@ -3369,7 +3369,7 @@
             <p:ph idx="1"/>
             <p:extLst>
               <p:ext uri="{D42A27DB-BD31-4B8C-83A1-F6EECF244321}">
-                <p14:modId xmlns="" xmlns:p14="http://schemas.microsoft.com/office/powerpoint/2010/main" val="1383281811"/>
+                <p14:modId xmlns:p14="http://schemas.microsoft.com/office/powerpoint/2010/main" val="1383281811"/>
               </p:ext>
             </p:extLst>
           </p:nvPr>
@@ -4222,14 +4222,14 @@
             <p:ph idx="1"/>
             <p:extLst>
               <p:ext uri="{D42A27DB-BD31-4B8C-83A1-F6EECF244321}">
-                <p14:modId xmlns="" xmlns:p14="http://schemas.microsoft.com/office/powerpoint/2010/main" val="4218020183"/>
+                <p14:modId xmlns:p14="http://schemas.microsoft.com/office/powerpoint/2010/main" val="1086163034"/>
               </p:ext>
             </p:extLst>
           </p:nvPr>
         </p:nvGraphicFramePr>
         <p:xfrm>
           <a:off x="1508035" y="1356680"/>
-          <a:ext cx="10300788" cy="4569286"/>
+          <a:ext cx="10300788" cy="4819077"/>
         </p:xfrm>
         <a:graphic>
           <a:graphicData uri="http://schemas.openxmlformats.org/drawingml/2006/table">
@@ -4781,7 +4781,7 @@
                           <a:ea typeface="Calibri" panose="020F0502020204030204" pitchFamily="34" charset="0"/>
                           <a:cs typeface="Times New Roman" panose="02020603050405020304" pitchFamily="18" charset="0"/>
                         </a:rPr>
-                        <a:t>100%</a:t>
+                        <a:t>90%</a:t>
                       </a:r>
                       <a:endParaRPr lang="en-US" sz="1400" dirty="0">
                         <a:effectLst/>
@@ -4816,7 +4816,7 @@
                           <a:ea typeface="Calibri" panose="020F0502020204030204" pitchFamily="34" charset="0"/>
                           <a:cs typeface="Times New Roman" panose="02020603050405020304" pitchFamily="18" charset="0"/>
                         </a:rPr>
-                        <a:t>100%</a:t>
+                        <a:t>90%</a:t>
                       </a:r>
                       <a:endParaRPr lang="en-US" sz="1400" dirty="0">
                         <a:effectLst/>
@@ -4930,6 +4930,24 @@
                           <a:cs typeface="+mn-cs"/>
                         </a:rPr>
                         <a:t> </a:t>
+                      </a:r>
+                      <a:r>
+                        <a:rPr lang="en-US" sz="1400" dirty="0" smtClean="0">
+                          <a:effectLst/>
+                          <a:latin typeface="+mn-lt"/>
+                          <a:ea typeface="+mn-ea"/>
+                          <a:cs typeface="+mn-cs"/>
+                        </a:rPr>
+                        <a:t>Finish</a:t>
+                      </a:r>
+                      <a:r>
+                        <a:rPr lang="en-US" sz="1400" baseline="0" dirty="0" smtClean="0">
+                          <a:effectLst/>
+                          <a:latin typeface="+mn-lt"/>
+                          <a:ea typeface="+mn-ea"/>
+                          <a:cs typeface="+mn-cs"/>
+                        </a:rPr>
+                        <a:t> implementing exception handling</a:t>
                       </a:r>
                       <a:endParaRPr lang="en-US" sz="1400" dirty="0">
                         <a:effectLst/>
@@ -5597,7 +5615,7 @@
     </p:spTree>
     <p:extLst>
       <p:ext uri="{BB962C8B-B14F-4D97-AF65-F5344CB8AC3E}">
-        <p14:creationId xmlns="" xmlns:p14="http://schemas.microsoft.com/office/powerpoint/2010/main" val="4270080904"/>
+        <p14:creationId xmlns:p14="http://schemas.microsoft.com/office/powerpoint/2010/main" val="4270080904"/>
       </p:ext>
     </p:extLst>
   </p:cSld>
@@ -5650,7 +5668,7 @@
     </p:spTree>
     <p:extLst>
       <p:ext uri="{BB962C8B-B14F-4D97-AF65-F5344CB8AC3E}">
-        <p14:creationId xmlns="" xmlns:p14="http://schemas.microsoft.com/office/powerpoint/2010/main" val="4270080904"/>
+        <p14:creationId xmlns:p14="http://schemas.microsoft.com/office/powerpoint/2010/main" val="4270080904"/>
       </p:ext>
     </p:extLst>
   </p:cSld>
@@ -5770,7 +5788,7 @@
     </p:spTree>
     <p:extLst>
       <p:ext uri="{BB962C8B-B14F-4D97-AF65-F5344CB8AC3E}">
-        <p14:creationId xmlns="" xmlns:p14="http://schemas.microsoft.com/office/powerpoint/2010/main" val="4270080904"/>
+        <p14:creationId xmlns:p14="http://schemas.microsoft.com/office/powerpoint/2010/main" val="4270080904"/>
       </p:ext>
     </p:extLst>
   </p:cSld>
@@ -5848,7 +5866,27 @@
             </a:pPr>
             <a:r>
               <a:rPr lang="en-US" sz="4000" dirty="0" smtClean="0"/>
-              <a:t>Added assert statement to ensure the function will never return a negative value</a:t>
+              <a:t>Added </a:t>
+            </a:r>
+            <a:r>
+              <a:rPr lang="en-US" sz="4000" dirty="0"/>
+              <a:t>e</a:t>
+            </a:r>
+            <a:r>
+              <a:rPr lang="en-US" sz="4000" dirty="0" smtClean="0"/>
+              <a:t>xception </a:t>
+            </a:r>
+            <a:r>
+              <a:rPr lang="en-US" sz="4000" dirty="0"/>
+              <a:t>h</a:t>
+            </a:r>
+            <a:r>
+              <a:rPr lang="en-US" sz="4000" dirty="0" smtClean="0"/>
+              <a:t>andling </a:t>
+            </a:r>
+            <a:r>
+              <a:rPr lang="en-US" sz="4000" dirty="0" smtClean="0"/>
+              <a:t>statement to ensure the function will never return a negative value</a:t>
             </a:r>
           </a:p>
           <a:p>
@@ -5874,7 +5912,7 @@
     </p:spTree>
     <p:extLst>
       <p:ext uri="{BB962C8B-B14F-4D97-AF65-F5344CB8AC3E}">
-        <p14:creationId xmlns="" xmlns:p14="http://schemas.microsoft.com/office/powerpoint/2010/main" val="4270080904"/>
+        <p14:creationId xmlns:p14="http://schemas.microsoft.com/office/powerpoint/2010/main" val="4270080904"/>
       </p:ext>
     </p:extLst>
   </p:cSld>
@@ -5980,7 +6018,7 @@
     </p:spTree>
     <p:extLst>
       <p:ext uri="{BB962C8B-B14F-4D97-AF65-F5344CB8AC3E}">
-        <p14:creationId xmlns="" xmlns:p14="http://schemas.microsoft.com/office/powerpoint/2010/main" val="4270080904"/>
+        <p14:creationId xmlns:p14="http://schemas.microsoft.com/office/powerpoint/2010/main" val="4270080904"/>
       </p:ext>
     </p:extLst>
   </p:cSld>
@@ -6060,7 +6098,6 @@
               <a:rPr lang="en-US" sz="3200" dirty="0" smtClean="0"/>
               <a:t>We currently have the Excel parsing occurring in a separate thread so as not to stop the entire program while waiting for the parser to finish. </a:t>
             </a:r>
-            <a:endParaRPr lang="en-US" sz="3200" dirty="0" smtClean="0"/>
           </a:p>
           <a:p>
             <a:pPr>
@@ -6076,11 +6113,7 @@
             </a:pPr>
             <a:r>
               <a:rPr lang="en-US" sz="3200" dirty="0" smtClean="0"/>
-              <a:t>We </a:t>
-            </a:r>
-            <a:r>
-              <a:rPr lang="en-US" sz="3200" dirty="0" smtClean="0"/>
-              <a:t>are 85% complete because we still need to implement a Semaphore in order to prevent a user from trying to access the data before it is finished being parsed.</a:t>
+              <a:t>We are 85% complete because we still need to implement a Semaphore in order to prevent a user from trying to access the data before it is finished being parsed.</a:t>
             </a:r>
             <a:endParaRPr lang="en-US" sz="3200" dirty="0"/>
           </a:p>
@@ -6089,7 +6122,7 @@
     </p:spTree>
     <p:extLst>
       <p:ext uri="{BB962C8B-B14F-4D97-AF65-F5344CB8AC3E}">
-        <p14:creationId xmlns="" xmlns:p14="http://schemas.microsoft.com/office/powerpoint/2010/main" val="4270080904"/>
+        <p14:creationId xmlns:p14="http://schemas.microsoft.com/office/powerpoint/2010/main" val="4270080904"/>
       </p:ext>
     </p:extLst>
   </p:cSld>
@@ -6167,13 +6200,8 @@
             </a:pPr>
             <a:r>
               <a:rPr lang="en-US" sz="3200" dirty="0" smtClean="0"/>
-              <a:t>GE </a:t>
-            </a:r>
-            <a:r>
-              <a:rPr lang="en-US" sz="3200" dirty="0" smtClean="0"/>
-              <a:t>instructed us to only concern ourselves with receiving an Excel file as input to the tool. </a:t>
-            </a:r>
-            <a:endParaRPr lang="en-US" sz="3200" dirty="0" smtClean="0"/>
+              <a:t>GE instructed us to only concern ourselves with receiving an Excel file as input to the tool. </a:t>
+            </a:r>
           </a:p>
           <a:p>
             <a:pPr>
@@ -6189,11 +6217,7 @@
             </a:pPr>
             <a:r>
               <a:rPr lang="en-US" sz="3200" dirty="0" smtClean="0"/>
-              <a:t>What </a:t>
-            </a:r>
-            <a:r>
-              <a:rPr lang="en-US" sz="3200" dirty="0" smtClean="0"/>
-              <a:t>we agreed upon was that the Excel file would be sent to an implemented parser that extracts the relevant information and stores it directly in the database. </a:t>
+              <a:t>What we agreed upon was that the Excel file would be sent to an implemented parser that extracts the relevant information and stores it directly in the database. </a:t>
             </a:r>
             <a:endParaRPr lang="en-US" sz="3200" dirty="0"/>
           </a:p>
@@ -6202,7 +6226,7 @@
     </p:spTree>
     <p:extLst>
       <p:ext uri="{BB962C8B-B14F-4D97-AF65-F5344CB8AC3E}">
-        <p14:creationId xmlns="" xmlns:p14="http://schemas.microsoft.com/office/powerpoint/2010/main" val="4270080904"/>
+        <p14:creationId xmlns:p14="http://schemas.microsoft.com/office/powerpoint/2010/main" val="4270080904"/>
       </p:ext>
     </p:extLst>
   </p:cSld>
@@ -6312,7 +6336,7 @@
     </p:spTree>
     <p:extLst>
       <p:ext uri="{BB962C8B-B14F-4D97-AF65-F5344CB8AC3E}">
-        <p14:creationId xmlns="" xmlns:p14="http://schemas.microsoft.com/office/powerpoint/2010/main" val="1202250340"/>
+        <p14:creationId xmlns:p14="http://schemas.microsoft.com/office/powerpoint/2010/main" val="1202250340"/>
       </p:ext>
     </p:extLst>
   </p:cSld>

</xml_diff>